<commit_message>
Working on evaluating performance
</commit_message>
<xml_diff>
--- a/Master thesis/Meetings/20-03 Finding best performing model.pptx
+++ b/Master thesis/Meetings/20-03 Finding best performing model.pptx
@@ -6,6 +6,8 @@
   </p:sldMasterIdLst>
   <p:sldIdLst>
     <p:sldId id="509" r:id="rId2"/>
+    <p:sldId id="511" r:id="rId3"/>
+    <p:sldId id="512" r:id="rId4"/>
   </p:sldIdLst>
   <p:sldSz cx="12192000" cy="6858000"/>
   <p:notesSz cx="6858000" cy="9144000"/>
@@ -104,13 +106,18 @@
       </a:defRPr>
     </a:lvl9pPr>
   </p:defaultTextStyle>
+  <p:extLst>
+    <p:ext uri="{EFAFB233-063F-42B5-8137-9DF3F51BA10A}">
+      <p15:sldGuideLst xmlns:p15="http://schemas.microsoft.com/office/powerpoint/2012/main"/>
+    </p:ext>
+  </p:extLst>
 </p:presentation>
 </file>
 
 <file path=ppt/revisionInfo.xml><?xml version="1.0" encoding="utf-8"?>
 <p1510:revInfo xmlns:a="http://schemas.openxmlformats.org/drawingml/2006/main" xmlns:r="http://schemas.openxmlformats.org/officeDocument/2006/relationships" xmlns:p1510="http://schemas.microsoft.com/office/powerpoint/2015/10/main">
   <p1510:revLst>
-    <p1510:client id="{6F4E2EB5-754F-495E-A6FB-8C980C153B12}" v="1" dt="2024-03-12T10:13:58.563"/>
+    <p1510:client id="{6F4E2EB5-754F-495E-A6FB-8C980C153B12}" v="3" dt="2024-03-18T11:26:45.042"/>
   </p1510:revLst>
 </p1510:revInfo>
 </file>
@@ -119,25 +126,110 @@
 <pc:chgInfo xmlns:a="http://schemas.openxmlformats.org/drawingml/2006/main" xmlns:r="http://schemas.openxmlformats.org/officeDocument/2006/relationships" xmlns:ac="http://schemas.microsoft.com/office/drawing/2013/main/command" xmlns:pc="http://schemas.microsoft.com/office/powerpoint/2013/main/command">
   <pc:docChgLst>
     <pc:chgData name="Birk Nøhr Dissing" userId="9f16f90f-bd2a-4063-a72f-deae502fc0f4" providerId="ADAL" clId="{6F4E2EB5-754F-495E-A6FB-8C980C153B12}"/>
-    <pc:docChg chg="addSld modSld">
-      <pc:chgData name="Birk Nøhr Dissing" userId="9f16f90f-bd2a-4063-a72f-deae502fc0f4" providerId="ADAL" clId="{6F4E2EB5-754F-495E-A6FB-8C980C153B12}" dt="2024-03-12T10:15:07.053" v="33" actId="14100"/>
+    <pc:docChg chg="custSel addSld delSld modSld">
+      <pc:chgData name="Birk Nøhr Dissing" userId="9f16f90f-bd2a-4063-a72f-deae502fc0f4" providerId="ADAL" clId="{6F4E2EB5-754F-495E-A6FB-8C980C153B12}" dt="2024-03-18T11:26:55.819" v="140" actId="20577"/>
       <pc:docMkLst>
         <pc:docMk/>
       </pc:docMkLst>
-      <pc:sldChg chg="modSp add mod">
-        <pc:chgData name="Birk Nøhr Dissing" userId="9f16f90f-bd2a-4063-a72f-deae502fc0f4" providerId="ADAL" clId="{6F4E2EB5-754F-495E-A6FB-8C980C153B12}" dt="2024-03-12T10:15:07.053" v="33" actId="14100"/>
+      <pc:sldChg chg="delSp modSp add mod">
+        <pc:chgData name="Birk Nøhr Dissing" userId="9f16f90f-bd2a-4063-a72f-deae502fc0f4" providerId="ADAL" clId="{6F4E2EB5-754F-495E-A6FB-8C980C153B12}" dt="2024-03-18T10:57:56.802" v="60" actId="14826"/>
         <pc:sldMkLst>
           <pc:docMk/>
           <pc:sldMk cId="1342509157" sldId="509"/>
         </pc:sldMkLst>
-        <pc:spChg chg="mod">
-          <ac:chgData name="Birk Nøhr Dissing" userId="9f16f90f-bd2a-4063-a72f-deae502fc0f4" providerId="ADAL" clId="{6F4E2EB5-754F-495E-A6FB-8C980C153B12}" dt="2024-03-12T10:15:07.053" v="33" actId="14100"/>
+        <pc:spChg chg="del mod">
+          <ac:chgData name="Birk Nøhr Dissing" userId="9f16f90f-bd2a-4063-a72f-deae502fc0f4" providerId="ADAL" clId="{6F4E2EB5-754F-495E-A6FB-8C980C153B12}" dt="2024-03-18T10:56:57.300" v="55" actId="478"/>
           <ac:spMkLst>
             <pc:docMk/>
             <pc:sldMk cId="1342509157" sldId="509"/>
             <ac:spMk id="9" creationId="{E5532A53-B0EB-09F3-039B-D326D5F1DA6A}"/>
           </ac:spMkLst>
         </pc:spChg>
+        <pc:picChg chg="mod">
+          <ac:chgData name="Birk Nøhr Dissing" userId="9f16f90f-bd2a-4063-a72f-deae502fc0f4" providerId="ADAL" clId="{6F4E2EB5-754F-495E-A6FB-8C980C153B12}" dt="2024-03-18T10:57:56.802" v="60" actId="14826"/>
+          <ac:picMkLst>
+            <pc:docMk/>
+            <pc:sldMk cId="1342509157" sldId="509"/>
+            <ac:picMk id="6" creationId="{4065F462-8577-12C9-75CC-127F460E2FEA}"/>
+          </ac:picMkLst>
+        </pc:picChg>
+        <pc:picChg chg="del">
+          <ac:chgData name="Birk Nøhr Dissing" userId="9f16f90f-bd2a-4063-a72f-deae502fc0f4" providerId="ADAL" clId="{6F4E2EB5-754F-495E-A6FB-8C980C153B12}" dt="2024-03-18T10:56:46.926" v="53" actId="478"/>
+          <ac:picMkLst>
+            <pc:docMk/>
+            <pc:sldMk cId="1342509157" sldId="509"/>
+            <ac:picMk id="10" creationId="{48BD58CF-CFC9-C762-A8BD-0894409D5746}"/>
+          </ac:picMkLst>
+        </pc:picChg>
+      </pc:sldChg>
+      <pc:sldChg chg="new del">
+        <pc:chgData name="Birk Nøhr Dissing" userId="9f16f90f-bd2a-4063-a72f-deae502fc0f4" providerId="ADAL" clId="{6F4E2EB5-754F-495E-A6FB-8C980C153B12}" dt="2024-03-18T10:58:59.424" v="63" actId="47"/>
+        <pc:sldMkLst>
+          <pc:docMk/>
+          <pc:sldMk cId="2927136727" sldId="510"/>
+        </pc:sldMkLst>
+      </pc:sldChg>
+      <pc:sldChg chg="modSp add mod">
+        <pc:chgData name="Birk Nøhr Dissing" userId="9f16f90f-bd2a-4063-a72f-deae502fc0f4" providerId="ADAL" clId="{6F4E2EB5-754F-495E-A6FB-8C980C153B12}" dt="2024-03-18T10:59:15.027" v="64" actId="14826"/>
+        <pc:sldMkLst>
+          <pc:docMk/>
+          <pc:sldMk cId="879944232" sldId="511"/>
+        </pc:sldMkLst>
+        <pc:picChg chg="mod">
+          <ac:chgData name="Birk Nøhr Dissing" userId="9f16f90f-bd2a-4063-a72f-deae502fc0f4" providerId="ADAL" clId="{6F4E2EB5-754F-495E-A6FB-8C980C153B12}" dt="2024-03-18T10:59:15.027" v="64" actId="14826"/>
+          <ac:picMkLst>
+            <pc:docMk/>
+            <pc:sldMk cId="879944232" sldId="511"/>
+            <ac:picMk id="6" creationId="{4065F462-8577-12C9-75CC-127F460E2FEA}"/>
+          </ac:picMkLst>
+        </pc:picChg>
+      </pc:sldChg>
+      <pc:sldChg chg="addSp delSp modSp new mod">
+        <pc:chgData name="Birk Nøhr Dissing" userId="9f16f90f-bd2a-4063-a72f-deae502fc0f4" providerId="ADAL" clId="{6F4E2EB5-754F-495E-A6FB-8C980C153B12}" dt="2024-03-18T11:26:55.819" v="140" actId="20577"/>
+        <pc:sldMkLst>
+          <pc:docMk/>
+          <pc:sldMk cId="913959119" sldId="512"/>
+        </pc:sldMkLst>
+        <pc:spChg chg="del">
+          <ac:chgData name="Birk Nøhr Dissing" userId="9f16f90f-bd2a-4063-a72f-deae502fc0f4" providerId="ADAL" clId="{6F4E2EB5-754F-495E-A6FB-8C980C153B12}" dt="2024-03-18T11:18:18.908" v="71" actId="478"/>
+          <ac:spMkLst>
+            <pc:docMk/>
+            <pc:sldMk cId="913959119" sldId="512"/>
+            <ac:spMk id="2" creationId="{D0BE31D0-4538-D705-A597-37B15534EFEB}"/>
+          </ac:spMkLst>
+        </pc:spChg>
+        <pc:spChg chg="del">
+          <ac:chgData name="Birk Nøhr Dissing" userId="9f16f90f-bd2a-4063-a72f-deae502fc0f4" providerId="ADAL" clId="{6F4E2EB5-754F-495E-A6FB-8C980C153B12}" dt="2024-03-18T11:18:13.234" v="68" actId="478"/>
+          <ac:spMkLst>
+            <pc:docMk/>
+            <pc:sldMk cId="913959119" sldId="512"/>
+            <ac:spMk id="3" creationId="{858B1066-B19B-132A-AEAC-7CB506B6F3F0}"/>
+          </ac:spMkLst>
+        </pc:spChg>
+        <pc:spChg chg="del">
+          <ac:chgData name="Birk Nøhr Dissing" userId="9f16f90f-bd2a-4063-a72f-deae502fc0f4" providerId="ADAL" clId="{6F4E2EB5-754F-495E-A6FB-8C980C153B12}" dt="2024-03-18T11:18:15.531" v="69" actId="478"/>
+          <ac:spMkLst>
+            <pc:docMk/>
+            <pc:sldMk cId="913959119" sldId="512"/>
+            <ac:spMk id="4" creationId="{FF445BDB-9641-E59F-BE48-42460E25D10C}"/>
+          </ac:spMkLst>
+        </pc:spChg>
+        <pc:spChg chg="add mod">
+          <ac:chgData name="Birk Nøhr Dissing" userId="9f16f90f-bd2a-4063-a72f-deae502fc0f4" providerId="ADAL" clId="{6F4E2EB5-754F-495E-A6FB-8C980C153B12}" dt="2024-03-18T11:26:55.819" v="140" actId="20577"/>
+          <ac:spMkLst>
+            <pc:docMk/>
+            <pc:sldMk cId="913959119" sldId="512"/>
+            <ac:spMk id="7" creationId="{0665DB94-1B8C-27D8-4C65-06C2CFAAA03D}"/>
+          </ac:spMkLst>
+        </pc:spChg>
+        <pc:picChg chg="add mod">
+          <ac:chgData name="Birk Nøhr Dissing" userId="9f16f90f-bd2a-4063-a72f-deae502fc0f4" providerId="ADAL" clId="{6F4E2EB5-754F-495E-A6FB-8C980C153B12}" dt="2024-03-18T11:25:31.171" v="76" actId="14826"/>
+          <ac:picMkLst>
+            <pc:docMk/>
+            <pc:sldMk cId="913959119" sldId="512"/>
+            <ac:picMk id="6" creationId="{A152E1B7-412C-C101-75BE-5860ADF536D8}"/>
+          </ac:picMkLst>
+        </pc:picChg>
       </pc:sldChg>
     </pc:docChg>
   </pc:docChgLst>
@@ -291,7 +383,7 @@
           <a:p>
             <a:fld id="{E94593C1-42F7-4E3B-987E-ADFC527D4F26}" type="datetimeFigureOut">
               <a:rPr lang="da-DK" smtClean="0"/>
-              <a:t>12-03-2024</a:t>
+              <a:t>18-03-2024</a:t>
             </a:fld>
             <a:endParaRPr lang="da-DK"/>
           </a:p>
@@ -489,7 +581,7 @@
           <a:p>
             <a:fld id="{E94593C1-42F7-4E3B-987E-ADFC527D4F26}" type="datetimeFigureOut">
               <a:rPr lang="da-DK" smtClean="0"/>
-              <a:t>12-03-2024</a:t>
+              <a:t>18-03-2024</a:t>
             </a:fld>
             <a:endParaRPr lang="da-DK"/>
           </a:p>
@@ -697,7 +789,7 @@
           <a:p>
             <a:fld id="{E94593C1-42F7-4E3B-987E-ADFC527D4F26}" type="datetimeFigureOut">
               <a:rPr lang="da-DK" smtClean="0"/>
-              <a:t>12-03-2024</a:t>
+              <a:t>18-03-2024</a:t>
             </a:fld>
             <a:endParaRPr lang="da-DK"/>
           </a:p>
@@ -956,7 +1048,7 @@
           <a:p>
             <a:fld id="{782CEA36-139A-4E3F-B6A0-7BD657AD45E8}" type="datetime1">
               <a:rPr lang="en-GB" smtClean="0"/>
-              <a:t>12/03/2024</a:t>
+              <a:t>18/03/2024</a:t>
             </a:fld>
             <a:endParaRPr lang="en-GB" dirty="0"/>
           </a:p>
@@ -1142,7 +1234,7 @@
           <a:p>
             <a:fld id="{E94593C1-42F7-4E3B-987E-ADFC527D4F26}" type="datetimeFigureOut">
               <a:rPr lang="da-DK" smtClean="0"/>
-              <a:t>12-03-2024</a:t>
+              <a:t>18-03-2024</a:t>
             </a:fld>
             <a:endParaRPr lang="da-DK"/>
           </a:p>
@@ -1417,7 +1509,7 @@
           <a:p>
             <a:fld id="{E94593C1-42F7-4E3B-987E-ADFC527D4F26}" type="datetimeFigureOut">
               <a:rPr lang="da-DK" smtClean="0"/>
-              <a:t>12-03-2024</a:t>
+              <a:t>18-03-2024</a:t>
             </a:fld>
             <a:endParaRPr lang="da-DK"/>
           </a:p>
@@ -1682,7 +1774,7 @@
           <a:p>
             <a:fld id="{E94593C1-42F7-4E3B-987E-ADFC527D4F26}" type="datetimeFigureOut">
               <a:rPr lang="da-DK" smtClean="0"/>
-              <a:t>12-03-2024</a:t>
+              <a:t>18-03-2024</a:t>
             </a:fld>
             <a:endParaRPr lang="da-DK"/>
           </a:p>
@@ -2094,7 +2186,7 @@
           <a:p>
             <a:fld id="{E94593C1-42F7-4E3B-987E-ADFC527D4F26}" type="datetimeFigureOut">
               <a:rPr lang="da-DK" smtClean="0"/>
-              <a:t>12-03-2024</a:t>
+              <a:t>18-03-2024</a:t>
             </a:fld>
             <a:endParaRPr lang="da-DK"/>
           </a:p>
@@ -2235,7 +2327,7 @@
           <a:p>
             <a:fld id="{E94593C1-42F7-4E3B-987E-ADFC527D4F26}" type="datetimeFigureOut">
               <a:rPr lang="da-DK" smtClean="0"/>
-              <a:t>12-03-2024</a:t>
+              <a:t>18-03-2024</a:t>
             </a:fld>
             <a:endParaRPr lang="da-DK"/>
           </a:p>
@@ -2348,7 +2440,7 @@
           <a:p>
             <a:fld id="{E94593C1-42F7-4E3B-987E-ADFC527D4F26}" type="datetimeFigureOut">
               <a:rPr lang="da-DK" smtClean="0"/>
-              <a:t>12-03-2024</a:t>
+              <a:t>18-03-2024</a:t>
             </a:fld>
             <a:endParaRPr lang="da-DK"/>
           </a:p>
@@ -2659,7 +2751,7 @@
           <a:p>
             <a:fld id="{E94593C1-42F7-4E3B-987E-ADFC527D4F26}" type="datetimeFigureOut">
               <a:rPr lang="da-DK" smtClean="0"/>
-              <a:t>12-03-2024</a:t>
+              <a:t>18-03-2024</a:t>
             </a:fld>
             <a:endParaRPr lang="da-DK"/>
           </a:p>
@@ -2947,7 +3039,7 @@
           <a:p>
             <a:fld id="{E94593C1-42F7-4E3B-987E-ADFC527D4F26}" type="datetimeFigureOut">
               <a:rPr lang="da-DK" smtClean="0"/>
-              <a:t>12-03-2024</a:t>
+              <a:t>18-03-2024</a:t>
             </a:fld>
             <a:endParaRPr lang="da-DK"/>
           </a:p>
@@ -3188,7 +3280,7 @@
           <a:p>
             <a:fld id="{E94593C1-42F7-4E3B-987E-ADFC527D4F26}" type="datetimeFigureOut">
               <a:rPr lang="da-DK" smtClean="0"/>
-              <a:t>12-03-2024</a:t>
+              <a:t>18-03-2024</a:t>
             </a:fld>
             <a:endParaRPr lang="da-DK"/>
           </a:p>
@@ -3633,78 +3725,8 @@
         </p:blipFill>
         <p:spPr>
           <a:xfrm>
-            <a:off x="3993502" y="164690"/>
-            <a:ext cx="7525312" cy="6578731"/>
-          </a:xfrm>
-          <a:prstGeom prst="rect">
-            <a:avLst/>
-          </a:prstGeom>
-        </p:spPr>
-      </p:pic>
-      <p:sp>
-        <p:nvSpPr>
-          <p:cNvPr id="9" name="TextBox 8">
-            <a:extLst>
-              <a:ext uri="{FF2B5EF4-FFF2-40B4-BE49-F238E27FC236}">
-                <a16:creationId xmlns:a16="http://schemas.microsoft.com/office/drawing/2014/main" id="{E5532A53-B0EB-09F3-039B-D326D5F1DA6A}"/>
-              </a:ext>
-            </a:extLst>
-          </p:cNvPr>
-          <p:cNvSpPr txBox="1"/>
-          <p:nvPr/>
-        </p:nvSpPr>
-        <p:spPr>
-          <a:xfrm>
-            <a:off x="150830" y="606491"/>
-            <a:ext cx="3987538" cy="1200329"/>
-          </a:xfrm>
-          <a:prstGeom prst="rect">
-            <a:avLst/>
-          </a:prstGeom>
-          <a:noFill/>
-        </p:spPr>
-        <p:txBody>
-          <a:bodyPr wrap="square" rtlCol="0">
-            <a:spAutoFit/>
-          </a:bodyPr>
-          <a:lstStyle/>
-          <a:p>
-            <a:r>
-              <a:rPr lang="da-DK" sz="3600" dirty="0" err="1"/>
-              <a:t>Different</a:t>
-            </a:r>
-            <a:r>
-              <a:rPr lang="da-DK" sz="3600" dirty="0"/>
-              <a:t> archetypes of model</a:t>
-            </a:r>
-            <a:endParaRPr lang="en-GB" sz="3600" dirty="0"/>
-          </a:p>
-        </p:txBody>
-      </p:sp>
-      <p:pic>
-        <p:nvPicPr>
-          <p:cNvPr id="10" name="Billede 2">
-            <a:extLst>
-              <a:ext uri="{FF2B5EF4-FFF2-40B4-BE49-F238E27FC236}">
-                <a16:creationId xmlns:a16="http://schemas.microsoft.com/office/drawing/2014/main" id="{48BD58CF-CFC9-C762-A8BD-0894409D5746}"/>
-              </a:ext>
-            </a:extLst>
-          </p:cNvPr>
-          <p:cNvPicPr>
-            <a:picLocks noChangeAspect="1"/>
-          </p:cNvPicPr>
-          <p:nvPr/>
-        </p:nvPicPr>
-        <p:blipFill>
-          <a:blip r:embed="rId3"/>
-          <a:stretch>
-            <a:fillRect/>
-          </a:stretch>
-        </p:blipFill>
-        <p:spPr>
-          <a:xfrm>
-            <a:off x="408142" y="2682332"/>
-            <a:ext cx="2877221" cy="2162922"/>
+            <a:off x="1920428" y="0"/>
+            <a:ext cx="7854342" cy="6867815"/>
           </a:xfrm>
           <a:prstGeom prst="rect">
             <a:avLst/>
@@ -3715,6 +3737,192 @@
     <p:extLst>
       <p:ext uri="{BB962C8B-B14F-4D97-AF65-F5344CB8AC3E}">
         <p14:creationId xmlns:p14="http://schemas.microsoft.com/office/powerpoint/2010/main" val="1342509157"/>
+      </p:ext>
+    </p:extLst>
+  </p:cSld>
+  <p:clrMapOvr>
+    <a:masterClrMapping/>
+  </p:clrMapOvr>
+</p:sld>
+</file>
+
+<file path=ppt/slides/slide2.xml><?xml version="1.0" encoding="utf-8"?>
+<p:sld xmlns:a="http://schemas.openxmlformats.org/drawingml/2006/main" xmlns:r="http://schemas.openxmlformats.org/officeDocument/2006/relationships" xmlns:p="http://schemas.openxmlformats.org/presentationml/2006/main">
+  <p:cSld>
+    <p:spTree>
+      <p:nvGrpSpPr>
+        <p:cNvPr id="1" name=""/>
+        <p:cNvGrpSpPr/>
+        <p:nvPr/>
+      </p:nvGrpSpPr>
+      <p:grpSpPr>
+        <a:xfrm>
+          <a:off x="0" y="0"/>
+          <a:ext cx="0" cy="0"/>
+          <a:chOff x="0" y="0"/>
+          <a:chExt cx="0" cy="0"/>
+        </a:xfrm>
+      </p:grpSpPr>
+      <p:pic>
+        <p:nvPicPr>
+          <p:cNvPr id="6" name="Picture 5">
+            <a:extLst>
+              <a:ext uri="{FF2B5EF4-FFF2-40B4-BE49-F238E27FC236}">
+                <a16:creationId xmlns:a16="http://schemas.microsoft.com/office/drawing/2014/main" id="{4065F462-8577-12C9-75CC-127F460E2FEA}"/>
+              </a:ext>
+            </a:extLst>
+          </p:cNvPr>
+          <p:cNvPicPr>
+            <a:picLocks noChangeAspect="1"/>
+          </p:cNvPicPr>
+          <p:nvPr/>
+        </p:nvPicPr>
+        <p:blipFill>
+          <a:blip r:embed="rId2">
+            <a:extLst>
+              <a:ext uri="{28A0092B-C50C-407E-A947-70E740481C1C}">
+                <a14:useLocalDpi xmlns:a14="http://schemas.microsoft.com/office/drawing/2010/main" val="0"/>
+              </a:ext>
+            </a:extLst>
+          </a:blip>
+          <a:srcRect/>
+          <a:stretch/>
+        </p:blipFill>
+        <p:spPr>
+          <a:xfrm>
+            <a:off x="1920428" y="0"/>
+            <a:ext cx="7854342" cy="6867814"/>
+          </a:xfrm>
+          <a:prstGeom prst="rect">
+            <a:avLst/>
+          </a:prstGeom>
+        </p:spPr>
+      </p:pic>
+    </p:spTree>
+    <p:extLst>
+      <p:ext uri="{BB962C8B-B14F-4D97-AF65-F5344CB8AC3E}">
+        <p14:creationId xmlns:p14="http://schemas.microsoft.com/office/powerpoint/2010/main" val="879944232"/>
+      </p:ext>
+    </p:extLst>
+  </p:cSld>
+  <p:clrMapOvr>
+    <a:masterClrMapping/>
+  </p:clrMapOvr>
+</p:sld>
+</file>
+
+<file path=ppt/slides/slide3.xml><?xml version="1.0" encoding="utf-8"?>
+<p:sld xmlns:a="http://schemas.openxmlformats.org/drawingml/2006/main" xmlns:r="http://schemas.openxmlformats.org/officeDocument/2006/relationships" xmlns:p="http://schemas.openxmlformats.org/presentationml/2006/main">
+  <p:cSld>
+    <p:spTree>
+      <p:nvGrpSpPr>
+        <p:cNvPr id="1" name=""/>
+        <p:cNvGrpSpPr/>
+        <p:nvPr/>
+      </p:nvGrpSpPr>
+      <p:grpSpPr>
+        <a:xfrm>
+          <a:off x="0" y="0"/>
+          <a:ext cx="0" cy="0"/>
+          <a:chOff x="0" y="0"/>
+          <a:chExt cx="0" cy="0"/>
+        </a:xfrm>
+      </p:grpSpPr>
+      <p:pic>
+        <p:nvPicPr>
+          <p:cNvPr id="6" name="Billede 5">
+            <a:extLst>
+              <a:ext uri="{FF2B5EF4-FFF2-40B4-BE49-F238E27FC236}">
+                <a16:creationId xmlns:a16="http://schemas.microsoft.com/office/drawing/2014/main" id="{A152E1B7-412C-C101-75BE-5860ADF536D8}"/>
+              </a:ext>
+            </a:extLst>
+          </p:cNvPr>
+          <p:cNvPicPr>
+            <a:picLocks noChangeAspect="1"/>
+          </p:cNvPicPr>
+          <p:nvPr/>
+        </p:nvPicPr>
+        <p:blipFill>
+          <a:blip r:embed="rId2">
+            <a:extLst>
+              <a:ext uri="{28A0092B-C50C-407E-A947-70E740481C1C}">
+                <a14:useLocalDpi xmlns:a14="http://schemas.microsoft.com/office/drawing/2010/main" val="0"/>
+              </a:ext>
+            </a:extLst>
+          </a:blip>
+          <a:srcRect/>
+          <a:stretch/>
+        </p:blipFill>
+        <p:spPr>
+          <a:xfrm>
+            <a:off x="1625203" y="623131"/>
+            <a:ext cx="8941592" cy="5611737"/>
+          </a:xfrm>
+          <a:prstGeom prst="rect">
+            <a:avLst/>
+          </a:prstGeom>
+        </p:spPr>
+      </p:pic>
+      <p:sp>
+        <p:nvSpPr>
+          <p:cNvPr id="7" name="Tekstfelt 6">
+            <a:extLst>
+              <a:ext uri="{FF2B5EF4-FFF2-40B4-BE49-F238E27FC236}">
+                <a16:creationId xmlns:a16="http://schemas.microsoft.com/office/drawing/2014/main" id="{0665DB94-1B8C-27D8-4C65-06C2CFAAA03D}"/>
+              </a:ext>
+            </a:extLst>
+          </p:cNvPr>
+          <p:cNvSpPr txBox="1"/>
+          <p:nvPr/>
+        </p:nvSpPr>
+        <p:spPr>
+          <a:xfrm>
+            <a:off x="377072" y="5948313"/>
+            <a:ext cx="2714920" cy="646331"/>
+          </a:xfrm>
+          <a:prstGeom prst="rect">
+            <a:avLst/>
+          </a:prstGeom>
+          <a:noFill/>
+        </p:spPr>
+        <p:txBody>
+          <a:bodyPr wrap="square" rtlCol="0">
+            <a:spAutoFit/>
+          </a:bodyPr>
+          <a:lstStyle/>
+          <a:p>
+            <a:r>
+              <a:rPr lang="da-DK" dirty="0"/>
+              <a:t>Check </a:t>
+            </a:r>
+            <a:r>
+              <a:rPr lang="da-DK" dirty="0" err="1"/>
+              <a:t>how</a:t>
+            </a:r>
+            <a:r>
+              <a:rPr lang="da-DK" dirty="0"/>
+              <a:t> it looks with </a:t>
+            </a:r>
+            <a:r>
+              <a:rPr lang="da-DK" dirty="0" err="1"/>
+              <a:t>higher</a:t>
+            </a:r>
+            <a:r>
+              <a:rPr lang="da-DK" dirty="0"/>
+              <a:t> </a:t>
+            </a:r>
+            <a:r>
+              <a:rPr lang="da-DK" dirty="0" err="1"/>
+              <a:t>prediction</a:t>
+            </a:r>
+            <a:endParaRPr lang="da-DK" dirty="0"/>
+          </a:p>
+        </p:txBody>
+      </p:sp>
+    </p:spTree>
+    <p:extLst>
+      <p:ext uri="{BB962C8B-B14F-4D97-AF65-F5344CB8AC3E}">
+        <p14:creationId xmlns:p14="http://schemas.microsoft.com/office/powerpoint/2010/main" val="913959119"/>
       </p:ext>
     </p:extLst>
   </p:cSld>

</xml_diff>

<commit_message>
Working on determining best hyperparameters
</commit_message>
<xml_diff>
--- a/Master thesis/Meetings/20-03 Finding best performing model.pptx
+++ b/Master thesis/Meetings/20-03 Finding best performing model.pptx
@@ -7,7 +7,19 @@
   <p:sldIdLst>
     <p:sldId id="509" r:id="rId2"/>
     <p:sldId id="511" r:id="rId3"/>
-    <p:sldId id="512" r:id="rId4"/>
+    <p:sldId id="516" r:id="rId4"/>
+    <p:sldId id="514" r:id="rId5"/>
+    <p:sldId id="521" r:id="rId6"/>
+    <p:sldId id="515" r:id="rId7"/>
+    <p:sldId id="517" r:id="rId8"/>
+    <p:sldId id="518" r:id="rId9"/>
+    <p:sldId id="523" r:id="rId10"/>
+    <p:sldId id="519" r:id="rId11"/>
+    <p:sldId id="524" r:id="rId12"/>
+    <p:sldId id="512" r:id="rId13"/>
+    <p:sldId id="527" r:id="rId14"/>
+    <p:sldId id="513" r:id="rId15"/>
+    <p:sldId id="528" r:id="rId16"/>
   </p:sldIdLst>
   <p:sldSz cx="12192000" cy="6858000"/>
   <p:notesSz cx="6858000" cy="9144000"/>
@@ -383,7 +395,7 @@
           <a:p>
             <a:fld id="{E94593C1-42F7-4E3B-987E-ADFC527D4F26}" type="datetimeFigureOut">
               <a:rPr lang="da-DK" smtClean="0"/>
-              <a:t>18-03-2024</a:t>
+              <a:t>19-03-2024</a:t>
             </a:fld>
             <a:endParaRPr lang="da-DK"/>
           </a:p>
@@ -437,7 +449,7 @@
           <a:p>
             <a:fld id="{D8BFA4D6-4E9B-4855-BE47-152E578FE399}" type="slidenum">
               <a:rPr lang="da-DK" smtClean="0"/>
-              <a:t>‹nr.›</a:t>
+              <a:t>‹#›</a:t>
             </a:fld>
             <a:endParaRPr lang="da-DK"/>
           </a:p>
@@ -581,7 +593,7 @@
           <a:p>
             <a:fld id="{E94593C1-42F7-4E3B-987E-ADFC527D4F26}" type="datetimeFigureOut">
               <a:rPr lang="da-DK" smtClean="0"/>
-              <a:t>18-03-2024</a:t>
+              <a:t>19-03-2024</a:t>
             </a:fld>
             <a:endParaRPr lang="da-DK"/>
           </a:p>
@@ -635,7 +647,7 @@
           <a:p>
             <a:fld id="{D8BFA4D6-4E9B-4855-BE47-152E578FE399}" type="slidenum">
               <a:rPr lang="da-DK" smtClean="0"/>
-              <a:t>‹nr.›</a:t>
+              <a:t>‹#›</a:t>
             </a:fld>
             <a:endParaRPr lang="da-DK"/>
           </a:p>
@@ -789,7 +801,7 @@
           <a:p>
             <a:fld id="{E94593C1-42F7-4E3B-987E-ADFC527D4F26}" type="datetimeFigureOut">
               <a:rPr lang="da-DK" smtClean="0"/>
-              <a:t>18-03-2024</a:t>
+              <a:t>19-03-2024</a:t>
             </a:fld>
             <a:endParaRPr lang="da-DK"/>
           </a:p>
@@ -843,7 +855,7 @@
           <a:p>
             <a:fld id="{D8BFA4D6-4E9B-4855-BE47-152E578FE399}" type="slidenum">
               <a:rPr lang="da-DK" smtClean="0"/>
-              <a:t>‹nr.›</a:t>
+              <a:t>‹#›</a:t>
             </a:fld>
             <a:endParaRPr lang="da-DK"/>
           </a:p>
@@ -1048,7 +1060,7 @@
           <a:p>
             <a:fld id="{782CEA36-139A-4E3F-B6A0-7BD657AD45E8}" type="datetime1">
               <a:rPr lang="en-GB" smtClean="0"/>
-              <a:t>18/03/2024</a:t>
+              <a:t>19/03/2024</a:t>
             </a:fld>
             <a:endParaRPr lang="en-GB" dirty="0"/>
           </a:p>
@@ -1090,7 +1102,7 @@
           <a:p>
             <a:fld id="{091A926C-488A-4E3E-9C21-57CAA120E114}" type="slidenum">
               <a:rPr lang="en-GB" smtClean="0"/>
-              <a:t>‹nr.›</a:t>
+              <a:t>‹#›</a:t>
             </a:fld>
             <a:endParaRPr lang="en-GB" dirty="0"/>
           </a:p>
@@ -1234,7 +1246,7 @@
           <a:p>
             <a:fld id="{E94593C1-42F7-4E3B-987E-ADFC527D4F26}" type="datetimeFigureOut">
               <a:rPr lang="da-DK" smtClean="0"/>
-              <a:t>18-03-2024</a:t>
+              <a:t>19-03-2024</a:t>
             </a:fld>
             <a:endParaRPr lang="da-DK"/>
           </a:p>
@@ -1288,7 +1300,7 @@
           <a:p>
             <a:fld id="{D8BFA4D6-4E9B-4855-BE47-152E578FE399}" type="slidenum">
               <a:rPr lang="da-DK" smtClean="0"/>
-              <a:t>‹nr.›</a:t>
+              <a:t>‹#›</a:t>
             </a:fld>
             <a:endParaRPr lang="da-DK"/>
           </a:p>
@@ -1509,7 +1521,7 @@
           <a:p>
             <a:fld id="{E94593C1-42F7-4E3B-987E-ADFC527D4F26}" type="datetimeFigureOut">
               <a:rPr lang="da-DK" smtClean="0"/>
-              <a:t>18-03-2024</a:t>
+              <a:t>19-03-2024</a:t>
             </a:fld>
             <a:endParaRPr lang="da-DK"/>
           </a:p>
@@ -1563,7 +1575,7 @@
           <a:p>
             <a:fld id="{D8BFA4D6-4E9B-4855-BE47-152E578FE399}" type="slidenum">
               <a:rPr lang="da-DK" smtClean="0"/>
-              <a:t>‹nr.›</a:t>
+              <a:t>‹#›</a:t>
             </a:fld>
             <a:endParaRPr lang="da-DK"/>
           </a:p>
@@ -1774,7 +1786,7 @@
           <a:p>
             <a:fld id="{E94593C1-42F7-4E3B-987E-ADFC527D4F26}" type="datetimeFigureOut">
               <a:rPr lang="da-DK" smtClean="0"/>
-              <a:t>18-03-2024</a:t>
+              <a:t>19-03-2024</a:t>
             </a:fld>
             <a:endParaRPr lang="da-DK"/>
           </a:p>
@@ -1828,7 +1840,7 @@
           <a:p>
             <a:fld id="{D8BFA4D6-4E9B-4855-BE47-152E578FE399}" type="slidenum">
               <a:rPr lang="da-DK" smtClean="0"/>
-              <a:t>‹nr.›</a:t>
+              <a:t>‹#›</a:t>
             </a:fld>
             <a:endParaRPr lang="da-DK"/>
           </a:p>
@@ -2186,7 +2198,7 @@
           <a:p>
             <a:fld id="{E94593C1-42F7-4E3B-987E-ADFC527D4F26}" type="datetimeFigureOut">
               <a:rPr lang="da-DK" smtClean="0"/>
-              <a:t>18-03-2024</a:t>
+              <a:t>19-03-2024</a:t>
             </a:fld>
             <a:endParaRPr lang="da-DK"/>
           </a:p>
@@ -2240,7 +2252,7 @@
           <a:p>
             <a:fld id="{D8BFA4D6-4E9B-4855-BE47-152E578FE399}" type="slidenum">
               <a:rPr lang="da-DK" smtClean="0"/>
-              <a:t>‹nr.›</a:t>
+              <a:t>‹#›</a:t>
             </a:fld>
             <a:endParaRPr lang="da-DK"/>
           </a:p>
@@ -2327,7 +2339,7 @@
           <a:p>
             <a:fld id="{E94593C1-42F7-4E3B-987E-ADFC527D4F26}" type="datetimeFigureOut">
               <a:rPr lang="da-DK" smtClean="0"/>
-              <a:t>18-03-2024</a:t>
+              <a:t>19-03-2024</a:t>
             </a:fld>
             <a:endParaRPr lang="da-DK"/>
           </a:p>
@@ -2381,7 +2393,7 @@
           <a:p>
             <a:fld id="{D8BFA4D6-4E9B-4855-BE47-152E578FE399}" type="slidenum">
               <a:rPr lang="da-DK" smtClean="0"/>
-              <a:t>‹nr.›</a:t>
+              <a:t>‹#›</a:t>
             </a:fld>
             <a:endParaRPr lang="da-DK"/>
           </a:p>
@@ -2440,7 +2452,7 @@
           <a:p>
             <a:fld id="{E94593C1-42F7-4E3B-987E-ADFC527D4F26}" type="datetimeFigureOut">
               <a:rPr lang="da-DK" smtClean="0"/>
-              <a:t>18-03-2024</a:t>
+              <a:t>19-03-2024</a:t>
             </a:fld>
             <a:endParaRPr lang="da-DK"/>
           </a:p>
@@ -2494,7 +2506,7 @@
           <a:p>
             <a:fld id="{D8BFA4D6-4E9B-4855-BE47-152E578FE399}" type="slidenum">
               <a:rPr lang="da-DK" smtClean="0"/>
-              <a:t>‹nr.›</a:t>
+              <a:t>‹#›</a:t>
             </a:fld>
             <a:endParaRPr lang="da-DK"/>
           </a:p>
@@ -2751,7 +2763,7 @@
           <a:p>
             <a:fld id="{E94593C1-42F7-4E3B-987E-ADFC527D4F26}" type="datetimeFigureOut">
               <a:rPr lang="da-DK" smtClean="0"/>
-              <a:t>18-03-2024</a:t>
+              <a:t>19-03-2024</a:t>
             </a:fld>
             <a:endParaRPr lang="da-DK"/>
           </a:p>
@@ -2805,7 +2817,7 @@
           <a:p>
             <a:fld id="{D8BFA4D6-4E9B-4855-BE47-152E578FE399}" type="slidenum">
               <a:rPr lang="da-DK" smtClean="0"/>
-              <a:t>‹nr.›</a:t>
+              <a:t>‹#›</a:t>
             </a:fld>
             <a:endParaRPr lang="da-DK"/>
           </a:p>
@@ -3039,7 +3051,7 @@
           <a:p>
             <a:fld id="{E94593C1-42F7-4E3B-987E-ADFC527D4F26}" type="datetimeFigureOut">
               <a:rPr lang="da-DK" smtClean="0"/>
-              <a:t>18-03-2024</a:t>
+              <a:t>19-03-2024</a:t>
             </a:fld>
             <a:endParaRPr lang="da-DK"/>
           </a:p>
@@ -3093,7 +3105,7 @@
           <a:p>
             <a:fld id="{D8BFA4D6-4E9B-4855-BE47-152E578FE399}" type="slidenum">
               <a:rPr lang="da-DK" smtClean="0"/>
-              <a:t>‹nr.›</a:t>
+              <a:t>‹#›</a:t>
             </a:fld>
             <a:endParaRPr lang="da-DK"/>
           </a:p>
@@ -3280,7 +3292,7 @@
           <a:p>
             <a:fld id="{E94593C1-42F7-4E3B-987E-ADFC527D4F26}" type="datetimeFigureOut">
               <a:rPr lang="da-DK" smtClean="0"/>
-              <a:t>18-03-2024</a:t>
+              <a:t>19-03-2024</a:t>
             </a:fld>
             <a:endParaRPr lang="da-DK"/>
           </a:p>
@@ -3370,7 +3382,7 @@
           <a:p>
             <a:fld id="{D8BFA4D6-4E9B-4855-BE47-152E578FE399}" type="slidenum">
               <a:rPr lang="da-DK" smtClean="0"/>
-              <a:t>‹nr.›</a:t>
+              <a:t>‹#›</a:t>
             </a:fld>
             <a:endParaRPr lang="da-DK"/>
           </a:p>
@@ -3726,7 +3738,7 @@
         <p:spPr>
           <a:xfrm>
             <a:off x="1920428" y="0"/>
-            <a:ext cx="7854342" cy="6867815"/>
+            <a:ext cx="7854342" cy="6867814"/>
           </a:xfrm>
           <a:prstGeom prst="rect">
             <a:avLst/>
@@ -3737,6 +3749,797 @@
     <p:extLst>
       <p:ext uri="{BB962C8B-B14F-4D97-AF65-F5344CB8AC3E}">
         <p14:creationId xmlns:p14="http://schemas.microsoft.com/office/powerpoint/2010/main" val="1342509157"/>
+      </p:ext>
+    </p:extLst>
+  </p:cSld>
+  <p:clrMapOvr>
+    <a:masterClrMapping/>
+  </p:clrMapOvr>
+</p:sld>
+</file>
+
+<file path=ppt/slides/slide10.xml><?xml version="1.0" encoding="utf-8"?>
+<p:sld xmlns:a="http://schemas.openxmlformats.org/drawingml/2006/main" xmlns:r="http://schemas.openxmlformats.org/officeDocument/2006/relationships" xmlns:p="http://schemas.openxmlformats.org/presentationml/2006/main">
+  <p:cSld>
+    <p:bg>
+      <p:bgPr>
+        <a:solidFill>
+          <a:schemeClr val="bg1"/>
+        </a:solidFill>
+        <a:effectLst/>
+      </p:bgPr>
+    </p:bg>
+    <p:spTree>
+      <p:nvGrpSpPr>
+        <p:cNvPr id="1" name="">
+          <a:extLst>
+            <a:ext uri="{FF2B5EF4-FFF2-40B4-BE49-F238E27FC236}">
+              <a16:creationId xmlns:a16="http://schemas.microsoft.com/office/drawing/2014/main" id="{A9F25AF3-DEE4-F59B-D98D-E89B3C7D6CF0}"/>
+            </a:ext>
+          </a:extLst>
+        </p:cNvPr>
+        <p:cNvGrpSpPr/>
+        <p:nvPr/>
+      </p:nvGrpSpPr>
+      <p:grpSpPr>
+        <a:xfrm>
+          <a:off x="0" y="0"/>
+          <a:ext cx="0" cy="0"/>
+          <a:chOff x="0" y="0"/>
+          <a:chExt cx="0" cy="0"/>
+        </a:xfrm>
+      </p:grpSpPr>
+      <p:sp>
+        <p:nvSpPr>
+          <p:cNvPr id="11" name="Rectangle 10">
+            <a:extLst>
+              <a:ext uri="{FF2B5EF4-FFF2-40B4-BE49-F238E27FC236}">
+                <a16:creationId xmlns:a16="http://schemas.microsoft.com/office/drawing/2014/main" id="{A4AC5506-6312-4701-8D3C-40187889A947}"/>
+              </a:ext>
+              <a:ext uri="{C183D7F6-B498-43B3-948B-1728B52AA6E4}">
+                <adec:decorative xmlns:adec="http://schemas.microsoft.com/office/drawing/2017/decorative" val="1"/>
+              </a:ext>
+            </a:extLst>
+          </p:cNvPr>
+          <p:cNvSpPr>
+            <a:spLocks noGrp="1" noRot="1" noChangeAspect="1" noMove="1" noResize="1" noEditPoints="1" noAdjustHandles="1" noChangeArrowheads="1" noChangeShapeType="1" noTextEdit="1"/>
+          </p:cNvSpPr>
+          <p:nvPr>
+            <p:extLst>
+              <p:ext uri="{386F3935-93C4-4BCD-93E2-E3B085C9AB24}">
+                <p16:designElem xmlns:p16="http://schemas.microsoft.com/office/powerpoint/2015/main" val="1"/>
+              </p:ext>
+            </p:extLst>
+          </p:nvPr>
+        </p:nvSpPr>
+        <p:spPr>
+          <a:xfrm>
+            <a:off x="0" y="651752"/>
+            <a:ext cx="12192000" cy="736551"/>
+          </a:xfrm>
+          <a:prstGeom prst="rect">
+            <a:avLst/>
+          </a:prstGeom>
+          <a:solidFill>
+            <a:schemeClr val="tx1"/>
+          </a:solidFill>
+          <a:ln>
+            <a:noFill/>
+          </a:ln>
+        </p:spPr>
+        <p:style>
+          <a:lnRef idx="2">
+            <a:schemeClr val="accent1">
+              <a:shade val="50000"/>
+            </a:schemeClr>
+          </a:lnRef>
+          <a:fillRef idx="1">
+            <a:schemeClr val="accent1"/>
+          </a:fillRef>
+          <a:effectRef idx="0">
+            <a:schemeClr val="accent1"/>
+          </a:effectRef>
+          <a:fontRef idx="minor">
+            <a:schemeClr val="lt1"/>
+          </a:fontRef>
+        </p:style>
+        <p:txBody>
+          <a:bodyPr rtlCol="0" anchor="ctr"/>
+          <a:lstStyle/>
+          <a:p>
+            <a:pPr algn="ctr"/>
+            <a:endParaRPr lang="en-US"/>
+          </a:p>
+        </p:txBody>
+      </p:sp>
+      <p:sp>
+        <p:nvSpPr>
+          <p:cNvPr id="3" name="Title 2">
+            <a:extLst>
+              <a:ext uri="{FF2B5EF4-FFF2-40B4-BE49-F238E27FC236}">
+                <a16:creationId xmlns:a16="http://schemas.microsoft.com/office/drawing/2014/main" id="{124D4A0C-803F-352F-E9D5-16B8AC7126B2}"/>
+              </a:ext>
+            </a:extLst>
+          </p:cNvPr>
+          <p:cNvSpPr>
+            <a:spLocks noGrp="1"/>
+          </p:cNvSpPr>
+          <p:nvPr>
+            <p:ph type="title"/>
+          </p:nvPr>
+        </p:nvSpPr>
+        <p:spPr>
+          <a:xfrm>
+            <a:off x="556532" y="643467"/>
+            <a:ext cx="11210925" cy="744836"/>
+          </a:xfrm>
+        </p:spPr>
+        <p:txBody>
+          <a:bodyPr vert="horz" lIns="91440" tIns="45720" rIns="91440" bIns="45720" rtlCol="0" anchor="ctr">
+            <a:normAutofit/>
+          </a:bodyPr>
+          <a:lstStyle/>
+          <a:p>
+            <a:pPr algn="ctr"/>
+            <a:r>
+              <a:rPr lang="en-US" sz="3200" kern="1200">
+                <a:solidFill>
+                  <a:schemeClr val="bg1"/>
+                </a:solidFill>
+                <a:latin typeface="+mj-lt"/>
+                <a:ea typeface="+mj-ea"/>
+                <a:cs typeface="+mj-cs"/>
+              </a:rPr>
+              <a:t>Effect of number of predictions on MAE</a:t>
+            </a:r>
+          </a:p>
+        </p:txBody>
+      </p:sp>
+      <p:pic>
+        <p:nvPicPr>
+          <p:cNvPr id="6" name="Picture 5">
+            <a:extLst>
+              <a:ext uri="{FF2B5EF4-FFF2-40B4-BE49-F238E27FC236}">
+                <a16:creationId xmlns:a16="http://schemas.microsoft.com/office/drawing/2014/main" id="{983AED8E-C660-C90E-37B2-7246ADD018CF}"/>
+              </a:ext>
+            </a:extLst>
+          </p:cNvPr>
+          <p:cNvPicPr>
+            <a:picLocks noChangeAspect="1"/>
+          </p:cNvPicPr>
+          <p:nvPr/>
+        </p:nvPicPr>
+        <p:blipFill>
+          <a:blip r:embed="rId2">
+            <a:extLst>
+              <a:ext uri="{28A0092B-C50C-407E-A947-70E740481C1C}">
+                <a14:useLocalDpi xmlns:a14="http://schemas.microsoft.com/office/drawing/2010/main" val="0"/>
+              </a:ext>
+            </a:extLst>
+          </a:blip>
+          <a:stretch/>
+        </p:blipFill>
+        <p:spPr>
+          <a:xfrm>
+            <a:off x="3065518" y="1675227"/>
+            <a:ext cx="6060963" cy="4394199"/>
+          </a:xfrm>
+          <a:prstGeom prst="rect">
+            <a:avLst/>
+          </a:prstGeom>
+        </p:spPr>
+      </p:pic>
+    </p:spTree>
+    <p:extLst>
+      <p:ext uri="{BB962C8B-B14F-4D97-AF65-F5344CB8AC3E}">
+        <p14:creationId xmlns:p14="http://schemas.microsoft.com/office/powerpoint/2010/main" val="2591798125"/>
+      </p:ext>
+    </p:extLst>
+  </p:cSld>
+  <p:clrMapOvr>
+    <a:masterClrMapping/>
+  </p:clrMapOvr>
+</p:sld>
+</file>
+
+<file path=ppt/slides/slide11.xml><?xml version="1.0" encoding="utf-8"?>
+<p:sld xmlns:a="http://schemas.openxmlformats.org/drawingml/2006/main" xmlns:r="http://schemas.openxmlformats.org/officeDocument/2006/relationships" xmlns:p="http://schemas.openxmlformats.org/presentationml/2006/main">
+  <p:cSld>
+    <p:spTree>
+      <p:nvGrpSpPr>
+        <p:cNvPr id="1" name=""/>
+        <p:cNvGrpSpPr/>
+        <p:nvPr/>
+      </p:nvGrpSpPr>
+      <p:grpSpPr>
+        <a:xfrm>
+          <a:off x="0" y="0"/>
+          <a:ext cx="0" cy="0"/>
+          <a:chOff x="0" y="0"/>
+          <a:chExt cx="0" cy="0"/>
+        </a:xfrm>
+      </p:grpSpPr>
+      <p:sp>
+        <p:nvSpPr>
+          <p:cNvPr id="3" name="Title 2">
+            <a:extLst>
+              <a:ext uri="{FF2B5EF4-FFF2-40B4-BE49-F238E27FC236}">
+                <a16:creationId xmlns:a16="http://schemas.microsoft.com/office/drawing/2014/main" id="{59971FB8-F877-D682-CFBA-B8FC2DB6FC7A}"/>
+              </a:ext>
+            </a:extLst>
+          </p:cNvPr>
+          <p:cNvSpPr>
+            <a:spLocks noGrp="1"/>
+          </p:cNvSpPr>
+          <p:nvPr>
+            <p:ph type="title"/>
+          </p:nvPr>
+        </p:nvSpPr>
+        <p:spPr/>
+        <p:txBody>
+          <a:bodyPr>
+            <a:normAutofit fontScale="90000"/>
+          </a:bodyPr>
+          <a:lstStyle/>
+          <a:p>
+            <a:r>
+              <a:rPr lang="da-DK" dirty="0"/>
+              <a:t>ARIMA Models with different number of predictions</a:t>
+            </a:r>
+            <a:endParaRPr lang="en-GB" dirty="0"/>
+          </a:p>
+        </p:txBody>
+      </p:sp>
+      <p:pic>
+        <p:nvPicPr>
+          <p:cNvPr id="6" name="Picture 5">
+            <a:extLst>
+              <a:ext uri="{FF2B5EF4-FFF2-40B4-BE49-F238E27FC236}">
+                <a16:creationId xmlns:a16="http://schemas.microsoft.com/office/drawing/2014/main" id="{9F067A6F-8400-08F2-B676-79AB7D5CC4C9}"/>
+              </a:ext>
+            </a:extLst>
+          </p:cNvPr>
+          <p:cNvPicPr>
+            <a:picLocks noChangeAspect="1"/>
+          </p:cNvPicPr>
+          <p:nvPr/>
+        </p:nvPicPr>
+        <p:blipFill>
+          <a:blip r:embed="rId2">
+            <a:extLst>
+              <a:ext uri="{28A0092B-C50C-407E-A947-70E740481C1C}">
+                <a14:useLocalDpi xmlns:a14="http://schemas.microsoft.com/office/drawing/2010/main" val="0"/>
+              </a:ext>
+            </a:extLst>
+          </a:blip>
+          <a:srcRect/>
+          <a:stretch/>
+        </p:blipFill>
+        <p:spPr>
+          <a:xfrm>
+            <a:off x="1633491" y="1252268"/>
+            <a:ext cx="8576632" cy="5470238"/>
+          </a:xfrm>
+          <a:prstGeom prst="rect">
+            <a:avLst/>
+          </a:prstGeom>
+        </p:spPr>
+      </p:pic>
+      <p:sp>
+        <p:nvSpPr>
+          <p:cNvPr id="7" name="TextBox 6">
+            <a:extLst>
+              <a:ext uri="{FF2B5EF4-FFF2-40B4-BE49-F238E27FC236}">
+                <a16:creationId xmlns:a16="http://schemas.microsoft.com/office/drawing/2014/main" id="{7258E697-ABFD-015A-61BA-C227F3510CB3}"/>
+              </a:ext>
+            </a:extLst>
+          </p:cNvPr>
+          <p:cNvSpPr txBox="1"/>
+          <p:nvPr/>
+        </p:nvSpPr>
+        <p:spPr>
+          <a:xfrm>
+            <a:off x="10342485" y="5113537"/>
+            <a:ext cx="1698594" cy="1477328"/>
+          </a:xfrm>
+          <a:prstGeom prst="rect">
+            <a:avLst/>
+          </a:prstGeom>
+          <a:noFill/>
+        </p:spPr>
+        <p:txBody>
+          <a:bodyPr wrap="square" rtlCol="0">
+            <a:spAutoFit/>
+          </a:bodyPr>
+          <a:lstStyle/>
+          <a:p>
+            <a:r>
+              <a:rPr lang="da-DK" dirty="0"/>
+              <a:t>Higher number of predictions might perform better with regularization</a:t>
+            </a:r>
+            <a:endParaRPr lang="en-GB" dirty="0"/>
+          </a:p>
+        </p:txBody>
+      </p:sp>
+    </p:spTree>
+    <p:extLst>
+      <p:ext uri="{BB962C8B-B14F-4D97-AF65-F5344CB8AC3E}">
+        <p14:creationId xmlns:p14="http://schemas.microsoft.com/office/powerpoint/2010/main" val="2280686660"/>
+      </p:ext>
+    </p:extLst>
+  </p:cSld>
+  <p:clrMapOvr>
+    <a:masterClrMapping/>
+  </p:clrMapOvr>
+</p:sld>
+</file>
+
+<file path=ppt/slides/slide12.xml><?xml version="1.0" encoding="utf-8"?>
+<p:sld xmlns:a="http://schemas.openxmlformats.org/drawingml/2006/main" xmlns:r="http://schemas.openxmlformats.org/officeDocument/2006/relationships" xmlns:p="http://schemas.openxmlformats.org/presentationml/2006/main">
+  <p:cSld>
+    <p:spTree>
+      <p:nvGrpSpPr>
+        <p:cNvPr id="1" name=""/>
+        <p:cNvGrpSpPr/>
+        <p:nvPr/>
+      </p:nvGrpSpPr>
+      <p:grpSpPr>
+        <a:xfrm>
+          <a:off x="0" y="0"/>
+          <a:ext cx="0" cy="0"/>
+          <a:chOff x="0" y="0"/>
+          <a:chExt cx="0" cy="0"/>
+        </a:xfrm>
+      </p:grpSpPr>
+      <p:pic>
+        <p:nvPicPr>
+          <p:cNvPr id="6" name="Billede 5">
+            <a:extLst>
+              <a:ext uri="{FF2B5EF4-FFF2-40B4-BE49-F238E27FC236}">
+                <a16:creationId xmlns:a16="http://schemas.microsoft.com/office/drawing/2014/main" id="{A152E1B7-412C-C101-75BE-5860ADF536D8}"/>
+              </a:ext>
+            </a:extLst>
+          </p:cNvPr>
+          <p:cNvPicPr>
+            <a:picLocks noChangeAspect="1"/>
+          </p:cNvPicPr>
+          <p:nvPr/>
+        </p:nvPicPr>
+        <p:blipFill>
+          <a:blip r:embed="rId2">
+            <a:extLst>
+              <a:ext uri="{28A0092B-C50C-407E-A947-70E740481C1C}">
+                <a14:useLocalDpi xmlns:a14="http://schemas.microsoft.com/office/drawing/2010/main" val="0"/>
+              </a:ext>
+            </a:extLst>
+          </a:blip>
+          <a:srcRect/>
+          <a:stretch/>
+        </p:blipFill>
+        <p:spPr>
+          <a:xfrm>
+            <a:off x="1696756" y="623131"/>
+            <a:ext cx="8798485" cy="5611737"/>
+          </a:xfrm>
+          <a:prstGeom prst="rect">
+            <a:avLst/>
+          </a:prstGeom>
+        </p:spPr>
+      </p:pic>
+      <p:sp>
+        <p:nvSpPr>
+          <p:cNvPr id="7" name="Tekstfelt 6">
+            <a:extLst>
+              <a:ext uri="{FF2B5EF4-FFF2-40B4-BE49-F238E27FC236}">
+                <a16:creationId xmlns:a16="http://schemas.microsoft.com/office/drawing/2014/main" id="{0665DB94-1B8C-27D8-4C65-06C2CFAAA03D}"/>
+              </a:ext>
+            </a:extLst>
+          </p:cNvPr>
+          <p:cNvSpPr txBox="1"/>
+          <p:nvPr/>
+        </p:nvSpPr>
+        <p:spPr>
+          <a:xfrm>
+            <a:off x="377072" y="5948313"/>
+            <a:ext cx="2714920" cy="646331"/>
+          </a:xfrm>
+          <a:prstGeom prst="rect">
+            <a:avLst/>
+          </a:prstGeom>
+          <a:noFill/>
+        </p:spPr>
+        <p:txBody>
+          <a:bodyPr wrap="square" rtlCol="0">
+            <a:spAutoFit/>
+          </a:bodyPr>
+          <a:lstStyle/>
+          <a:p>
+            <a:r>
+              <a:rPr lang="da-DK" dirty="0"/>
+              <a:t>Check </a:t>
+            </a:r>
+            <a:r>
+              <a:rPr lang="da-DK" dirty="0" err="1"/>
+              <a:t>how</a:t>
+            </a:r>
+            <a:r>
+              <a:rPr lang="da-DK" dirty="0"/>
+              <a:t> it looks with </a:t>
+            </a:r>
+            <a:r>
+              <a:rPr lang="da-DK" dirty="0" err="1"/>
+              <a:t>higher</a:t>
+            </a:r>
+            <a:r>
+              <a:rPr lang="da-DK" dirty="0"/>
+              <a:t> </a:t>
+            </a:r>
+            <a:r>
+              <a:rPr lang="da-DK" dirty="0" err="1"/>
+              <a:t>prediction</a:t>
+            </a:r>
+            <a:endParaRPr lang="da-DK" dirty="0"/>
+          </a:p>
+        </p:txBody>
+      </p:sp>
+    </p:spTree>
+    <p:extLst>
+      <p:ext uri="{BB962C8B-B14F-4D97-AF65-F5344CB8AC3E}">
+        <p14:creationId xmlns:p14="http://schemas.microsoft.com/office/powerpoint/2010/main" val="913959119"/>
+      </p:ext>
+    </p:extLst>
+  </p:cSld>
+  <p:clrMapOvr>
+    <a:masterClrMapping/>
+  </p:clrMapOvr>
+</p:sld>
+</file>
+
+<file path=ppt/slides/slide13.xml><?xml version="1.0" encoding="utf-8"?>
+<p:sld xmlns:a="http://schemas.openxmlformats.org/drawingml/2006/main" xmlns:r="http://schemas.openxmlformats.org/officeDocument/2006/relationships" xmlns:p="http://schemas.openxmlformats.org/presentationml/2006/main">
+  <p:cSld>
+    <p:spTree>
+      <p:nvGrpSpPr>
+        <p:cNvPr id="1" name="">
+          <a:extLst>
+            <a:ext uri="{FF2B5EF4-FFF2-40B4-BE49-F238E27FC236}">
+              <a16:creationId xmlns:a16="http://schemas.microsoft.com/office/drawing/2014/main" id="{F5428DD0-8AA2-C103-BA48-F3FD9D73126E}"/>
+            </a:ext>
+          </a:extLst>
+        </p:cNvPr>
+        <p:cNvGrpSpPr/>
+        <p:nvPr/>
+      </p:nvGrpSpPr>
+      <p:grpSpPr>
+        <a:xfrm>
+          <a:off x="0" y="0"/>
+          <a:ext cx="0" cy="0"/>
+          <a:chOff x="0" y="0"/>
+          <a:chExt cx="0" cy="0"/>
+        </a:xfrm>
+      </p:grpSpPr>
+      <p:sp>
+        <p:nvSpPr>
+          <p:cNvPr id="3" name="Title 2">
+            <a:extLst>
+              <a:ext uri="{FF2B5EF4-FFF2-40B4-BE49-F238E27FC236}">
+                <a16:creationId xmlns:a16="http://schemas.microsoft.com/office/drawing/2014/main" id="{4354B9B4-3297-7BA1-010D-18B10A2B67BB}"/>
+              </a:ext>
+            </a:extLst>
+          </p:cNvPr>
+          <p:cNvSpPr>
+            <a:spLocks noGrp="1"/>
+          </p:cNvSpPr>
+          <p:nvPr>
+            <p:ph type="title"/>
+          </p:nvPr>
+        </p:nvSpPr>
+        <p:spPr/>
+        <p:txBody>
+          <a:bodyPr>
+            <a:normAutofit/>
+          </a:bodyPr>
+          <a:lstStyle/>
+          <a:p>
+            <a:r>
+              <a:rPr lang="da-DK" dirty="0"/>
+              <a:t>ARIMA Model with input = 4, pred = 1</a:t>
+            </a:r>
+            <a:endParaRPr lang="en-GB" dirty="0"/>
+          </a:p>
+        </p:txBody>
+      </p:sp>
+      <p:pic>
+        <p:nvPicPr>
+          <p:cNvPr id="6" name="Picture 5">
+            <a:extLst>
+              <a:ext uri="{FF2B5EF4-FFF2-40B4-BE49-F238E27FC236}">
+                <a16:creationId xmlns:a16="http://schemas.microsoft.com/office/drawing/2014/main" id="{BB1AE369-B125-91BB-B07A-7936A299A688}"/>
+              </a:ext>
+            </a:extLst>
+          </p:cNvPr>
+          <p:cNvPicPr>
+            <a:picLocks noChangeAspect="1"/>
+          </p:cNvPicPr>
+          <p:nvPr/>
+        </p:nvPicPr>
+        <p:blipFill>
+          <a:blip r:embed="rId2">
+            <a:extLst>
+              <a:ext uri="{28A0092B-C50C-407E-A947-70E740481C1C}">
+                <a14:useLocalDpi xmlns:a14="http://schemas.microsoft.com/office/drawing/2010/main" val="0"/>
+              </a:ext>
+            </a:extLst>
+          </a:blip>
+          <a:srcRect/>
+          <a:stretch/>
+        </p:blipFill>
+        <p:spPr>
+          <a:xfrm>
+            <a:off x="1642369" y="1316078"/>
+            <a:ext cx="8566951" cy="5464062"/>
+          </a:xfrm>
+          <a:prstGeom prst="rect">
+            <a:avLst/>
+          </a:prstGeom>
+        </p:spPr>
+      </p:pic>
+    </p:spTree>
+    <p:extLst>
+      <p:ext uri="{BB962C8B-B14F-4D97-AF65-F5344CB8AC3E}">
+        <p14:creationId xmlns:p14="http://schemas.microsoft.com/office/powerpoint/2010/main" val="844475465"/>
+      </p:ext>
+    </p:extLst>
+  </p:cSld>
+  <p:clrMapOvr>
+    <a:masterClrMapping/>
+  </p:clrMapOvr>
+</p:sld>
+</file>
+
+<file path=ppt/slides/slide14.xml><?xml version="1.0" encoding="utf-8"?>
+<p:sld xmlns:a="http://schemas.openxmlformats.org/drawingml/2006/main" xmlns:r="http://schemas.openxmlformats.org/officeDocument/2006/relationships" xmlns:p="http://schemas.openxmlformats.org/presentationml/2006/main">
+  <p:cSld>
+    <p:spTree>
+      <p:nvGrpSpPr>
+        <p:cNvPr id="1" name=""/>
+        <p:cNvGrpSpPr/>
+        <p:nvPr/>
+      </p:nvGrpSpPr>
+      <p:grpSpPr>
+        <a:xfrm>
+          <a:off x="0" y="0"/>
+          <a:ext cx="0" cy="0"/>
+          <a:chOff x="0" y="0"/>
+          <a:chExt cx="0" cy="0"/>
+        </a:xfrm>
+      </p:grpSpPr>
+      <p:sp>
+        <p:nvSpPr>
+          <p:cNvPr id="3" name="Title 2">
+            <a:extLst>
+              <a:ext uri="{FF2B5EF4-FFF2-40B4-BE49-F238E27FC236}">
+                <a16:creationId xmlns:a16="http://schemas.microsoft.com/office/drawing/2014/main" id="{625172FE-8BCC-4700-DEE2-694FABC4CFBB}"/>
+              </a:ext>
+            </a:extLst>
+          </p:cNvPr>
+          <p:cNvSpPr>
+            <a:spLocks noGrp="1"/>
+          </p:cNvSpPr>
+          <p:nvPr>
+            <p:ph type="title"/>
+          </p:nvPr>
+        </p:nvSpPr>
+        <p:spPr>
+          <a:xfrm>
+            <a:off x="553455" y="443158"/>
+            <a:ext cx="11012486" cy="865187"/>
+          </a:xfrm>
+        </p:spPr>
+        <p:txBody>
+          <a:bodyPr>
+            <a:normAutofit fontScale="90000"/>
+          </a:bodyPr>
+          <a:lstStyle/>
+          <a:p>
+            <a:r>
+              <a:rPr lang="da-DK" dirty="0"/>
+              <a:t>Issues with simulations incorporating model (input, pred)</a:t>
+            </a:r>
+            <a:endParaRPr lang="en-GB" dirty="0"/>
+          </a:p>
+        </p:txBody>
+      </p:sp>
+      <p:sp>
+        <p:nvSpPr>
+          <p:cNvPr id="4" name="Content Placeholder 3">
+            <a:extLst>
+              <a:ext uri="{FF2B5EF4-FFF2-40B4-BE49-F238E27FC236}">
+                <a16:creationId xmlns:a16="http://schemas.microsoft.com/office/drawing/2014/main" id="{4D945136-CAA7-3ABA-FE38-5C4EF5E1B5E2}"/>
+              </a:ext>
+            </a:extLst>
+          </p:cNvPr>
+          <p:cNvSpPr>
+            <a:spLocks noGrp="1"/>
+          </p:cNvSpPr>
+          <p:nvPr>
+            <p:ph sz="half" idx="1"/>
+          </p:nvPr>
+        </p:nvSpPr>
+        <p:spPr>
+          <a:xfrm>
+            <a:off x="588964" y="1628775"/>
+            <a:ext cx="9567090" cy="4672800"/>
+          </a:xfrm>
+        </p:spPr>
+        <p:txBody>
+          <a:bodyPr/>
+          <a:lstStyle/>
+          <a:p>
+            <a:r>
+              <a:rPr lang="da-DK" dirty="0"/>
+              <a:t>(4, 1): LU decomposition error (statsmodels)</a:t>
+            </a:r>
+          </a:p>
+          <a:p>
+            <a:r>
+              <a:rPr lang="da-DK" dirty="0"/>
+              <a:t>(6, 2): LU decomposition error (statsmodels)</a:t>
+            </a:r>
+          </a:p>
+          <a:p>
+            <a:r>
+              <a:rPr lang="da-DK" dirty="0"/>
+              <a:t>(6, 3): LU decomposition error (statsmodels)</a:t>
+            </a:r>
+            <a:endParaRPr lang="en-GB" dirty="0"/>
+          </a:p>
+          <a:p>
+            <a:r>
+              <a:rPr lang="da-DK" dirty="0"/>
+              <a:t>(6, 4): LU decomposition error (statsmodels)</a:t>
+            </a:r>
+            <a:endParaRPr lang="en-GB" dirty="0"/>
+          </a:p>
+          <a:p>
+            <a:r>
+              <a:rPr lang="da-DK" dirty="0"/>
+              <a:t>(6, 5): LU decomposition error (statsmodels)</a:t>
+            </a:r>
+          </a:p>
+        </p:txBody>
+      </p:sp>
+    </p:spTree>
+    <p:extLst>
+      <p:ext uri="{BB962C8B-B14F-4D97-AF65-F5344CB8AC3E}">
+        <p14:creationId xmlns:p14="http://schemas.microsoft.com/office/powerpoint/2010/main" val="2227633798"/>
+      </p:ext>
+    </p:extLst>
+  </p:cSld>
+  <p:clrMapOvr>
+    <a:masterClrMapping/>
+  </p:clrMapOvr>
+</p:sld>
+</file>
+
+<file path=ppt/slides/slide15.xml><?xml version="1.0" encoding="utf-8"?>
+<p:sld xmlns:a="http://schemas.openxmlformats.org/drawingml/2006/main" xmlns:r="http://schemas.openxmlformats.org/officeDocument/2006/relationships" xmlns:p="http://schemas.openxmlformats.org/presentationml/2006/main">
+  <p:cSld>
+    <p:spTree>
+      <p:nvGrpSpPr>
+        <p:cNvPr id="1" name=""/>
+        <p:cNvGrpSpPr/>
+        <p:nvPr/>
+      </p:nvGrpSpPr>
+      <p:grpSpPr>
+        <a:xfrm>
+          <a:off x="0" y="0"/>
+          <a:ext cx="0" cy="0"/>
+          <a:chOff x="0" y="0"/>
+          <a:chExt cx="0" cy="0"/>
+        </a:xfrm>
+      </p:grpSpPr>
+      <p:sp>
+        <p:nvSpPr>
+          <p:cNvPr id="2" name="Picture Placeholder 1">
+            <a:extLst>
+              <a:ext uri="{FF2B5EF4-FFF2-40B4-BE49-F238E27FC236}">
+                <a16:creationId xmlns:a16="http://schemas.microsoft.com/office/drawing/2014/main" id="{A4E82E1B-8BF9-A2A2-EAD9-1B67106FA25B}"/>
+              </a:ext>
+            </a:extLst>
+          </p:cNvPr>
+          <p:cNvSpPr>
+            <a:spLocks noGrp="1"/>
+          </p:cNvSpPr>
+          <p:nvPr>
+            <p:ph type="pic" sz="quarter" idx="14"/>
+          </p:nvPr>
+        </p:nvSpPr>
+        <p:spPr/>
+        <p:txBody>
+          <a:bodyPr/>
+          <a:lstStyle/>
+          <a:p>
+            <a:endParaRPr lang="en-GB" dirty="0"/>
+          </a:p>
+        </p:txBody>
+      </p:sp>
+      <p:sp>
+        <p:nvSpPr>
+          <p:cNvPr id="3" name="Title 2">
+            <a:extLst>
+              <a:ext uri="{FF2B5EF4-FFF2-40B4-BE49-F238E27FC236}">
+                <a16:creationId xmlns:a16="http://schemas.microsoft.com/office/drawing/2014/main" id="{4A41C660-3EF0-A848-37C4-584EF0A5F0C4}"/>
+              </a:ext>
+            </a:extLst>
+          </p:cNvPr>
+          <p:cNvSpPr>
+            <a:spLocks noGrp="1"/>
+          </p:cNvSpPr>
+          <p:nvPr>
+            <p:ph type="title"/>
+          </p:nvPr>
+        </p:nvSpPr>
+        <p:spPr/>
+        <p:txBody>
+          <a:bodyPr/>
+          <a:lstStyle/>
+          <a:p>
+            <a:r>
+              <a:rPr lang="da-DK" dirty="0"/>
+              <a:t>Future tasks/problems</a:t>
+            </a:r>
+            <a:endParaRPr lang="en-GB" dirty="0"/>
+          </a:p>
+        </p:txBody>
+      </p:sp>
+      <p:sp>
+        <p:nvSpPr>
+          <p:cNvPr id="4" name="Content Placeholder 3">
+            <a:extLst>
+              <a:ext uri="{FF2B5EF4-FFF2-40B4-BE49-F238E27FC236}">
+                <a16:creationId xmlns:a16="http://schemas.microsoft.com/office/drawing/2014/main" id="{3C68845C-41D8-D307-8937-FD6ED9B6C40C}"/>
+              </a:ext>
+            </a:extLst>
+          </p:cNvPr>
+          <p:cNvSpPr>
+            <a:spLocks noGrp="1"/>
+          </p:cNvSpPr>
+          <p:nvPr>
+            <p:ph sz="half" idx="1"/>
+          </p:nvPr>
+        </p:nvSpPr>
+        <p:spPr/>
+        <p:txBody>
+          <a:bodyPr/>
+          <a:lstStyle/>
+          <a:p>
+            <a:r>
+              <a:rPr lang="da-DK" dirty="0"/>
+              <a:t>ARIMA model does not always converge</a:t>
+            </a:r>
+          </a:p>
+          <a:p>
+            <a:r>
+              <a:rPr lang="da-DK" dirty="0"/>
+              <a:t>No Regularization on ARIMA</a:t>
+            </a:r>
+          </a:p>
+          <a:p>
+            <a:r>
+              <a:rPr lang="da-DK" dirty="0"/>
+              <a:t>LU Decomposition when fitting model</a:t>
+            </a:r>
+          </a:p>
+          <a:p>
+            <a:endParaRPr lang="en-GB" dirty="0"/>
+          </a:p>
+        </p:txBody>
+      </p:sp>
+    </p:spTree>
+    <p:extLst>
+      <p:ext uri="{BB962C8B-B14F-4D97-AF65-F5344CB8AC3E}">
+        <p14:creationId xmlns:p14="http://schemas.microsoft.com/office/powerpoint/2010/main" val="2282443797"/>
       </p:ext>
     </p:extLst>
   </p:cSld>
@@ -3791,7 +4594,7 @@
         <p:spPr>
           <a:xfrm>
             <a:off x="1920428" y="0"/>
-            <a:ext cx="7854342" cy="6867814"/>
+            <a:ext cx="7854341" cy="6867814"/>
           </a:xfrm>
           <a:prstGeom prst="rect">
             <a:avLst/>
@@ -3816,7 +4619,13 @@
   <p:cSld>
     <p:spTree>
       <p:nvGrpSpPr>
-        <p:cNvPr id="1" name=""/>
+        <p:cNvPr id="1" name="">
+          <a:extLst>
+            <a:ext uri="{FF2B5EF4-FFF2-40B4-BE49-F238E27FC236}">
+              <a16:creationId xmlns:a16="http://schemas.microsoft.com/office/drawing/2014/main" id="{8C0B351D-D22B-ACE9-2449-E22B934BEDA8}"/>
+            </a:ext>
+          </a:extLst>
+        </p:cNvPr>
         <p:cNvGrpSpPr/>
         <p:nvPr/>
       </p:nvGrpSpPr>
@@ -3830,10 +4639,10 @@
       </p:grpSpPr>
       <p:pic>
         <p:nvPicPr>
-          <p:cNvPr id="6" name="Billede 5">
-            <a:extLst>
-              <a:ext uri="{FF2B5EF4-FFF2-40B4-BE49-F238E27FC236}">
-                <a16:creationId xmlns:a16="http://schemas.microsoft.com/office/drawing/2014/main" id="{A152E1B7-412C-C101-75BE-5860ADF536D8}"/>
+          <p:cNvPr id="6" name="Picture 5">
+            <a:extLst>
+              <a:ext uri="{FF2B5EF4-FFF2-40B4-BE49-F238E27FC236}">
+                <a16:creationId xmlns:a16="http://schemas.microsoft.com/office/drawing/2014/main" id="{9A52D7C6-FB32-7329-4F98-F17B4B386B00}"/>
               </a:ext>
             </a:extLst>
           </p:cNvPr>
@@ -3855,8 +4664,8 @@
         </p:blipFill>
         <p:spPr>
           <a:xfrm>
-            <a:off x="1625203" y="623131"/>
-            <a:ext cx="8941592" cy="5611737"/>
+            <a:off x="1920428" y="0"/>
+            <a:ext cx="7854341" cy="6867814"/>
           </a:xfrm>
           <a:prstGeom prst="rect">
             <a:avLst/>
@@ -3865,10 +4674,10 @@
       </p:pic>
       <p:sp>
         <p:nvSpPr>
-          <p:cNvPr id="7" name="Tekstfelt 6">
-            <a:extLst>
-              <a:ext uri="{FF2B5EF4-FFF2-40B4-BE49-F238E27FC236}">
-                <a16:creationId xmlns:a16="http://schemas.microsoft.com/office/drawing/2014/main" id="{0665DB94-1B8C-27D8-4C65-06C2CFAAA03D}"/>
+          <p:cNvPr id="2" name="TextBox 1">
+            <a:extLst>
+              <a:ext uri="{FF2B5EF4-FFF2-40B4-BE49-F238E27FC236}">
+                <a16:creationId xmlns:a16="http://schemas.microsoft.com/office/drawing/2014/main" id="{B51280BA-7B72-880A-09C9-8E107B286420}"/>
               </a:ext>
             </a:extLst>
           </p:cNvPr>
@@ -3877,8 +4686,8 @@
         </p:nvSpPr>
         <p:spPr>
           <a:xfrm>
-            <a:off x="377072" y="5948313"/>
-            <a:ext cx="2714920" cy="646331"/>
+            <a:off x="10182687" y="736847"/>
+            <a:ext cx="1775534" cy="369332"/>
           </a:xfrm>
           <a:prstGeom prst="rect">
             <a:avLst/>
@@ -3893,36 +4702,1148 @@
           <a:p>
             <a:r>
               <a:rPr lang="da-DK" dirty="0"/>
-              <a:t>Check </a:t>
-            </a:r>
-            <a:r>
-              <a:rPr lang="da-DK" dirty="0" err="1"/>
-              <a:t>how</a:t>
-            </a:r>
-            <a:r>
-              <a:rPr lang="da-DK" dirty="0"/>
-              <a:t> it looks with </a:t>
-            </a:r>
-            <a:r>
-              <a:rPr lang="da-DK" dirty="0" err="1"/>
-              <a:t>higher</a:t>
-            </a:r>
-            <a:r>
-              <a:rPr lang="da-DK" dirty="0"/>
-              <a:t> </a:t>
-            </a:r>
-            <a:r>
-              <a:rPr lang="da-DK" dirty="0" err="1"/>
-              <a:t>prediction</a:t>
-            </a:r>
-            <a:endParaRPr lang="da-DK" dirty="0"/>
+              <a:t>KS score of 0.034</a:t>
+            </a:r>
+            <a:endParaRPr lang="en-GB" dirty="0"/>
+          </a:p>
+        </p:txBody>
+      </p:sp>
+      <p:sp>
+        <p:nvSpPr>
+          <p:cNvPr id="3" name="Arrow: Down 2">
+            <a:extLst>
+              <a:ext uri="{FF2B5EF4-FFF2-40B4-BE49-F238E27FC236}">
+                <a16:creationId xmlns:a16="http://schemas.microsoft.com/office/drawing/2014/main" id="{8BEB1AEB-7044-3CDB-A8D3-F30619604EF1}"/>
+              </a:ext>
+            </a:extLst>
+          </p:cNvPr>
+          <p:cNvSpPr/>
+          <p:nvPr/>
+        </p:nvSpPr>
+        <p:spPr>
+          <a:xfrm rot="3199758">
+            <a:off x="9722357" y="939283"/>
+            <a:ext cx="117534" cy="1715586"/>
+          </a:xfrm>
+          <a:prstGeom prst="downArrow">
+            <a:avLst/>
+          </a:prstGeom>
+        </p:spPr>
+        <p:style>
+          <a:lnRef idx="2">
+            <a:schemeClr val="dk1">
+              <a:shade val="15000"/>
+            </a:schemeClr>
+          </a:lnRef>
+          <a:fillRef idx="1">
+            <a:schemeClr val="dk1"/>
+          </a:fillRef>
+          <a:effectRef idx="0">
+            <a:schemeClr val="dk1"/>
+          </a:effectRef>
+          <a:fontRef idx="minor">
+            <a:schemeClr val="lt1"/>
+          </a:fontRef>
+        </p:style>
+        <p:txBody>
+          <a:bodyPr rtlCol="0" anchor="ctr"/>
+          <a:lstStyle/>
+          <a:p>
+            <a:pPr algn="ctr"/>
+            <a:endParaRPr lang="en-GB"/>
           </a:p>
         </p:txBody>
       </p:sp>
     </p:spTree>
     <p:extLst>
       <p:ext uri="{BB962C8B-B14F-4D97-AF65-F5344CB8AC3E}">
-        <p14:creationId xmlns:p14="http://schemas.microsoft.com/office/powerpoint/2010/main" val="913959119"/>
+        <p14:creationId xmlns:p14="http://schemas.microsoft.com/office/powerpoint/2010/main" val="57929221"/>
+      </p:ext>
+    </p:extLst>
+  </p:cSld>
+  <p:clrMapOvr>
+    <a:masterClrMapping/>
+  </p:clrMapOvr>
+</p:sld>
+</file>
+
+<file path=ppt/slides/slide4.xml><?xml version="1.0" encoding="utf-8"?>
+<p:sld xmlns:a="http://schemas.openxmlformats.org/drawingml/2006/main" xmlns:r="http://schemas.openxmlformats.org/officeDocument/2006/relationships" xmlns:p="http://schemas.openxmlformats.org/presentationml/2006/main">
+  <p:cSld>
+    <p:bg>
+      <p:bgPr>
+        <a:solidFill>
+          <a:schemeClr val="bg1"/>
+        </a:solidFill>
+        <a:effectLst/>
+      </p:bgPr>
+    </p:bg>
+    <p:spTree>
+      <p:nvGrpSpPr>
+        <p:cNvPr id="1" name=""/>
+        <p:cNvGrpSpPr/>
+        <p:nvPr/>
+      </p:nvGrpSpPr>
+      <p:grpSpPr>
+        <a:xfrm>
+          <a:off x="0" y="0"/>
+          <a:ext cx="0" cy="0"/>
+          <a:chOff x="0" y="0"/>
+          <a:chExt cx="0" cy="0"/>
+        </a:xfrm>
+      </p:grpSpPr>
+      <p:sp>
+        <p:nvSpPr>
+          <p:cNvPr id="11" name="Rectangle 10">
+            <a:extLst>
+              <a:ext uri="{FF2B5EF4-FFF2-40B4-BE49-F238E27FC236}">
+                <a16:creationId xmlns:a16="http://schemas.microsoft.com/office/drawing/2014/main" id="{A4AC5506-6312-4701-8D3C-40187889A947}"/>
+              </a:ext>
+              <a:ext uri="{C183D7F6-B498-43B3-948B-1728B52AA6E4}">
+                <adec:decorative xmlns:adec="http://schemas.microsoft.com/office/drawing/2017/decorative" val="1"/>
+              </a:ext>
+            </a:extLst>
+          </p:cNvPr>
+          <p:cNvSpPr>
+            <a:spLocks noGrp="1" noRot="1" noChangeAspect="1" noMove="1" noResize="1" noEditPoints="1" noAdjustHandles="1" noChangeArrowheads="1" noChangeShapeType="1" noTextEdit="1"/>
+          </p:cNvSpPr>
+          <p:nvPr>
+            <p:extLst>
+              <p:ext uri="{386F3935-93C4-4BCD-93E2-E3B085C9AB24}">
+                <p16:designElem xmlns:p16="http://schemas.microsoft.com/office/powerpoint/2015/main" val="1"/>
+              </p:ext>
+            </p:extLst>
+          </p:nvPr>
+        </p:nvSpPr>
+        <p:spPr>
+          <a:xfrm>
+            <a:off x="0" y="651752"/>
+            <a:ext cx="12192000" cy="736551"/>
+          </a:xfrm>
+          <a:prstGeom prst="rect">
+            <a:avLst/>
+          </a:prstGeom>
+          <a:solidFill>
+            <a:schemeClr val="tx1"/>
+          </a:solidFill>
+          <a:ln>
+            <a:noFill/>
+          </a:ln>
+        </p:spPr>
+        <p:style>
+          <a:lnRef idx="2">
+            <a:schemeClr val="accent1">
+              <a:shade val="50000"/>
+            </a:schemeClr>
+          </a:lnRef>
+          <a:fillRef idx="1">
+            <a:schemeClr val="accent1"/>
+          </a:fillRef>
+          <a:effectRef idx="0">
+            <a:schemeClr val="accent1"/>
+          </a:effectRef>
+          <a:fontRef idx="minor">
+            <a:schemeClr val="lt1"/>
+          </a:fontRef>
+        </p:style>
+        <p:txBody>
+          <a:bodyPr rtlCol="0" anchor="ctr"/>
+          <a:lstStyle/>
+          <a:p>
+            <a:pPr algn="ctr"/>
+            <a:endParaRPr lang="en-US"/>
+          </a:p>
+        </p:txBody>
+      </p:sp>
+      <p:sp>
+        <p:nvSpPr>
+          <p:cNvPr id="3" name="Title 2">
+            <a:extLst>
+              <a:ext uri="{FF2B5EF4-FFF2-40B4-BE49-F238E27FC236}">
+                <a16:creationId xmlns:a16="http://schemas.microsoft.com/office/drawing/2014/main" id="{297ABAA8-BDAE-282D-CB00-EDEF2CF4A65C}"/>
+              </a:ext>
+            </a:extLst>
+          </p:cNvPr>
+          <p:cNvSpPr>
+            <a:spLocks noGrp="1"/>
+          </p:cNvSpPr>
+          <p:nvPr>
+            <p:ph type="title"/>
+          </p:nvPr>
+        </p:nvSpPr>
+        <p:spPr>
+          <a:xfrm>
+            <a:off x="556532" y="643467"/>
+            <a:ext cx="11210925" cy="744836"/>
+          </a:xfrm>
+        </p:spPr>
+        <p:txBody>
+          <a:bodyPr vert="horz" lIns="91440" tIns="45720" rIns="91440" bIns="45720" rtlCol="0" anchor="ctr">
+            <a:normAutofit/>
+          </a:bodyPr>
+          <a:lstStyle/>
+          <a:p>
+            <a:pPr algn="ctr"/>
+            <a:r>
+              <a:rPr lang="en-US" sz="3200" kern="1200">
+                <a:solidFill>
+                  <a:schemeClr val="bg1"/>
+                </a:solidFill>
+                <a:latin typeface="+mj-lt"/>
+                <a:ea typeface="+mj-ea"/>
+                <a:cs typeface="+mj-cs"/>
+              </a:rPr>
+              <a:t>Grid search for hyperparameters</a:t>
+            </a:r>
+          </a:p>
+        </p:txBody>
+      </p:sp>
+      <p:pic>
+        <p:nvPicPr>
+          <p:cNvPr id="6" name="Picture 5">
+            <a:extLst>
+              <a:ext uri="{FF2B5EF4-FFF2-40B4-BE49-F238E27FC236}">
+                <a16:creationId xmlns:a16="http://schemas.microsoft.com/office/drawing/2014/main" id="{A1E58427-FF7D-BCF8-C378-CD67930AA770}"/>
+              </a:ext>
+            </a:extLst>
+          </p:cNvPr>
+          <p:cNvPicPr>
+            <a:picLocks noChangeAspect="1"/>
+          </p:cNvPicPr>
+          <p:nvPr/>
+        </p:nvPicPr>
+        <p:blipFill>
+          <a:blip r:embed="rId2"/>
+          <a:stretch>
+            <a:fillRect/>
+          </a:stretch>
+        </p:blipFill>
+        <p:spPr>
+          <a:xfrm>
+            <a:off x="2494197" y="1675227"/>
+            <a:ext cx="7203606" cy="4394199"/>
+          </a:xfrm>
+          <a:prstGeom prst="rect">
+            <a:avLst/>
+          </a:prstGeom>
+        </p:spPr>
+      </p:pic>
+    </p:spTree>
+    <p:extLst>
+      <p:ext uri="{BB962C8B-B14F-4D97-AF65-F5344CB8AC3E}">
+        <p14:creationId xmlns:p14="http://schemas.microsoft.com/office/powerpoint/2010/main" val="3855802782"/>
+      </p:ext>
+    </p:extLst>
+  </p:cSld>
+  <p:clrMapOvr>
+    <a:masterClrMapping/>
+  </p:clrMapOvr>
+</p:sld>
+</file>
+
+<file path=ppt/slides/slide5.xml><?xml version="1.0" encoding="utf-8"?>
+<p:sld xmlns:a="http://schemas.openxmlformats.org/drawingml/2006/main" xmlns:r="http://schemas.openxmlformats.org/officeDocument/2006/relationships" xmlns:p="http://schemas.openxmlformats.org/presentationml/2006/main">
+  <p:cSld>
+    <p:bg>
+      <p:bgPr>
+        <a:solidFill>
+          <a:schemeClr val="bg1"/>
+        </a:solidFill>
+        <a:effectLst/>
+      </p:bgPr>
+    </p:bg>
+    <p:spTree>
+      <p:nvGrpSpPr>
+        <p:cNvPr id="1" name="">
+          <a:extLst>
+            <a:ext uri="{FF2B5EF4-FFF2-40B4-BE49-F238E27FC236}">
+              <a16:creationId xmlns:a16="http://schemas.microsoft.com/office/drawing/2014/main" id="{F1F650B5-E189-5E91-F9B4-D4B7ABC287C4}"/>
+            </a:ext>
+          </a:extLst>
+        </p:cNvPr>
+        <p:cNvGrpSpPr/>
+        <p:nvPr/>
+      </p:nvGrpSpPr>
+      <p:grpSpPr>
+        <a:xfrm>
+          <a:off x="0" y="0"/>
+          <a:ext cx="0" cy="0"/>
+          <a:chOff x="0" y="0"/>
+          <a:chExt cx="0" cy="0"/>
+        </a:xfrm>
+      </p:grpSpPr>
+      <p:sp>
+        <p:nvSpPr>
+          <p:cNvPr id="11" name="Rectangle 10">
+            <a:extLst>
+              <a:ext uri="{FF2B5EF4-FFF2-40B4-BE49-F238E27FC236}">
+                <a16:creationId xmlns:a16="http://schemas.microsoft.com/office/drawing/2014/main" id="{A4AC5506-6312-4701-8D3C-40187889A947}"/>
+              </a:ext>
+              <a:ext uri="{C183D7F6-B498-43B3-948B-1728B52AA6E4}">
+                <adec:decorative xmlns:adec="http://schemas.microsoft.com/office/drawing/2017/decorative" val="1"/>
+              </a:ext>
+            </a:extLst>
+          </p:cNvPr>
+          <p:cNvSpPr>
+            <a:spLocks noGrp="1" noRot="1" noChangeAspect="1" noMove="1" noResize="1" noEditPoints="1" noAdjustHandles="1" noChangeArrowheads="1" noChangeShapeType="1" noTextEdit="1"/>
+          </p:cNvSpPr>
+          <p:nvPr>
+            <p:extLst>
+              <p:ext uri="{386F3935-93C4-4BCD-93E2-E3B085C9AB24}">
+                <p16:designElem xmlns:p16="http://schemas.microsoft.com/office/powerpoint/2015/main" val="1"/>
+              </p:ext>
+            </p:extLst>
+          </p:nvPr>
+        </p:nvSpPr>
+        <p:spPr>
+          <a:xfrm>
+            <a:off x="0" y="651752"/>
+            <a:ext cx="12192000" cy="736551"/>
+          </a:xfrm>
+          <a:prstGeom prst="rect">
+            <a:avLst/>
+          </a:prstGeom>
+          <a:solidFill>
+            <a:schemeClr val="tx1"/>
+          </a:solidFill>
+          <a:ln>
+            <a:noFill/>
+          </a:ln>
+        </p:spPr>
+        <p:style>
+          <a:lnRef idx="2">
+            <a:schemeClr val="accent1">
+              <a:shade val="50000"/>
+            </a:schemeClr>
+          </a:lnRef>
+          <a:fillRef idx="1">
+            <a:schemeClr val="accent1"/>
+          </a:fillRef>
+          <a:effectRef idx="0">
+            <a:schemeClr val="accent1"/>
+          </a:effectRef>
+          <a:fontRef idx="minor">
+            <a:schemeClr val="lt1"/>
+          </a:fontRef>
+        </p:style>
+        <p:txBody>
+          <a:bodyPr rtlCol="0" anchor="ctr"/>
+          <a:lstStyle/>
+          <a:p>
+            <a:pPr algn="ctr"/>
+            <a:endParaRPr lang="en-US"/>
+          </a:p>
+        </p:txBody>
+      </p:sp>
+      <p:sp>
+        <p:nvSpPr>
+          <p:cNvPr id="3" name="Title 2">
+            <a:extLst>
+              <a:ext uri="{FF2B5EF4-FFF2-40B4-BE49-F238E27FC236}">
+                <a16:creationId xmlns:a16="http://schemas.microsoft.com/office/drawing/2014/main" id="{D07A3B2E-4F42-93EE-02E1-B64DE4A066C6}"/>
+              </a:ext>
+            </a:extLst>
+          </p:cNvPr>
+          <p:cNvSpPr>
+            <a:spLocks noGrp="1"/>
+          </p:cNvSpPr>
+          <p:nvPr>
+            <p:ph type="title"/>
+          </p:nvPr>
+        </p:nvSpPr>
+        <p:spPr>
+          <a:xfrm>
+            <a:off x="556532" y="643467"/>
+            <a:ext cx="11210925" cy="744836"/>
+          </a:xfrm>
+        </p:spPr>
+        <p:txBody>
+          <a:bodyPr vert="horz" lIns="91440" tIns="45720" rIns="91440" bIns="45720" rtlCol="0" anchor="ctr">
+            <a:normAutofit/>
+          </a:bodyPr>
+          <a:lstStyle/>
+          <a:p>
+            <a:pPr algn="ctr"/>
+            <a:r>
+              <a:rPr lang="en-US" sz="3200" kern="1200">
+                <a:solidFill>
+                  <a:schemeClr val="bg1"/>
+                </a:solidFill>
+                <a:latin typeface="+mj-lt"/>
+                <a:ea typeface="+mj-ea"/>
+                <a:cs typeface="+mj-cs"/>
+              </a:rPr>
+              <a:t>Grid search for hyperparameters</a:t>
+            </a:r>
+          </a:p>
+        </p:txBody>
+      </p:sp>
+      <p:pic>
+        <p:nvPicPr>
+          <p:cNvPr id="6" name="Picture 5">
+            <a:extLst>
+              <a:ext uri="{FF2B5EF4-FFF2-40B4-BE49-F238E27FC236}">
+                <a16:creationId xmlns:a16="http://schemas.microsoft.com/office/drawing/2014/main" id="{6D92A3A3-FDDC-5F9E-9BC8-2286B1842480}"/>
+              </a:ext>
+            </a:extLst>
+          </p:cNvPr>
+          <p:cNvPicPr>
+            <a:picLocks noChangeAspect="1"/>
+          </p:cNvPicPr>
+          <p:nvPr/>
+        </p:nvPicPr>
+        <p:blipFill>
+          <a:blip r:embed="rId2">
+            <a:extLst>
+              <a:ext uri="{28A0092B-C50C-407E-A947-70E740481C1C}">
+                <a14:useLocalDpi xmlns:a14="http://schemas.microsoft.com/office/drawing/2010/main" val="0"/>
+              </a:ext>
+            </a:extLst>
+          </a:blip>
+          <a:stretch/>
+        </p:blipFill>
+        <p:spPr>
+          <a:xfrm>
+            <a:off x="2656882" y="1516606"/>
+            <a:ext cx="6281843" cy="5108010"/>
+          </a:xfrm>
+          <a:prstGeom prst="rect">
+            <a:avLst/>
+          </a:prstGeom>
+        </p:spPr>
+      </p:pic>
+    </p:spTree>
+    <p:extLst>
+      <p:ext uri="{BB962C8B-B14F-4D97-AF65-F5344CB8AC3E}">
+        <p14:creationId xmlns:p14="http://schemas.microsoft.com/office/powerpoint/2010/main" val="3853152425"/>
+      </p:ext>
+    </p:extLst>
+  </p:cSld>
+  <p:clrMapOvr>
+    <a:masterClrMapping/>
+  </p:clrMapOvr>
+</p:sld>
+</file>
+
+<file path=ppt/slides/slide6.xml><?xml version="1.0" encoding="utf-8"?>
+<p:sld xmlns:a="http://schemas.openxmlformats.org/drawingml/2006/main" xmlns:r="http://schemas.openxmlformats.org/officeDocument/2006/relationships" xmlns:p="http://schemas.openxmlformats.org/presentationml/2006/main">
+  <p:cSld>
+    <p:bg>
+      <p:bgPr>
+        <a:solidFill>
+          <a:schemeClr val="bg1"/>
+        </a:solidFill>
+        <a:effectLst/>
+      </p:bgPr>
+    </p:bg>
+    <p:spTree>
+      <p:nvGrpSpPr>
+        <p:cNvPr id="1" name="">
+          <a:extLst>
+            <a:ext uri="{FF2B5EF4-FFF2-40B4-BE49-F238E27FC236}">
+              <a16:creationId xmlns:a16="http://schemas.microsoft.com/office/drawing/2014/main" id="{2E18DFCB-5CCD-96E9-6E4F-9D1F6EE48907}"/>
+            </a:ext>
+          </a:extLst>
+        </p:cNvPr>
+        <p:cNvGrpSpPr/>
+        <p:nvPr/>
+      </p:nvGrpSpPr>
+      <p:grpSpPr>
+        <a:xfrm>
+          <a:off x="0" y="0"/>
+          <a:ext cx="0" cy="0"/>
+          <a:chOff x="0" y="0"/>
+          <a:chExt cx="0" cy="0"/>
+        </a:xfrm>
+      </p:grpSpPr>
+      <p:sp>
+        <p:nvSpPr>
+          <p:cNvPr id="11" name="Rectangle 10">
+            <a:extLst>
+              <a:ext uri="{FF2B5EF4-FFF2-40B4-BE49-F238E27FC236}">
+                <a16:creationId xmlns:a16="http://schemas.microsoft.com/office/drawing/2014/main" id="{A4AC5506-6312-4701-8D3C-40187889A947}"/>
+              </a:ext>
+              <a:ext uri="{C183D7F6-B498-43B3-948B-1728B52AA6E4}">
+                <adec:decorative xmlns:adec="http://schemas.microsoft.com/office/drawing/2017/decorative" val="1"/>
+              </a:ext>
+            </a:extLst>
+          </p:cNvPr>
+          <p:cNvSpPr>
+            <a:spLocks noGrp="1" noRot="1" noChangeAspect="1" noMove="1" noResize="1" noEditPoints="1" noAdjustHandles="1" noChangeArrowheads="1" noChangeShapeType="1" noTextEdit="1"/>
+          </p:cNvSpPr>
+          <p:nvPr>
+            <p:extLst>
+              <p:ext uri="{386F3935-93C4-4BCD-93E2-E3B085C9AB24}">
+                <p16:designElem xmlns:p16="http://schemas.microsoft.com/office/powerpoint/2015/main" val="1"/>
+              </p:ext>
+            </p:extLst>
+          </p:nvPr>
+        </p:nvSpPr>
+        <p:spPr>
+          <a:xfrm>
+            <a:off x="0" y="651752"/>
+            <a:ext cx="12192000" cy="736551"/>
+          </a:xfrm>
+          <a:prstGeom prst="rect">
+            <a:avLst/>
+          </a:prstGeom>
+          <a:solidFill>
+            <a:schemeClr val="tx1"/>
+          </a:solidFill>
+          <a:ln>
+            <a:noFill/>
+          </a:ln>
+        </p:spPr>
+        <p:style>
+          <a:lnRef idx="2">
+            <a:schemeClr val="accent1">
+              <a:shade val="50000"/>
+            </a:schemeClr>
+          </a:lnRef>
+          <a:fillRef idx="1">
+            <a:schemeClr val="accent1"/>
+          </a:fillRef>
+          <a:effectRef idx="0">
+            <a:schemeClr val="accent1"/>
+          </a:effectRef>
+          <a:fontRef idx="minor">
+            <a:schemeClr val="lt1"/>
+          </a:fontRef>
+        </p:style>
+        <p:txBody>
+          <a:bodyPr rtlCol="0" anchor="ctr"/>
+          <a:lstStyle/>
+          <a:p>
+            <a:pPr algn="ctr"/>
+            <a:endParaRPr lang="en-US"/>
+          </a:p>
+        </p:txBody>
+      </p:sp>
+      <p:sp>
+        <p:nvSpPr>
+          <p:cNvPr id="3" name="Title 2">
+            <a:extLst>
+              <a:ext uri="{FF2B5EF4-FFF2-40B4-BE49-F238E27FC236}">
+                <a16:creationId xmlns:a16="http://schemas.microsoft.com/office/drawing/2014/main" id="{EE24F9BE-55B3-B1B0-C335-E65E1A7F06D7}"/>
+              </a:ext>
+            </a:extLst>
+          </p:cNvPr>
+          <p:cNvSpPr>
+            <a:spLocks noGrp="1"/>
+          </p:cNvSpPr>
+          <p:nvPr>
+            <p:ph type="title"/>
+          </p:nvPr>
+        </p:nvSpPr>
+        <p:spPr>
+          <a:xfrm>
+            <a:off x="556532" y="643467"/>
+            <a:ext cx="11210925" cy="744836"/>
+          </a:xfrm>
+        </p:spPr>
+        <p:txBody>
+          <a:bodyPr vert="horz" lIns="91440" tIns="45720" rIns="91440" bIns="45720" rtlCol="0" anchor="ctr">
+            <a:normAutofit/>
+          </a:bodyPr>
+          <a:lstStyle/>
+          <a:p>
+            <a:pPr algn="ctr"/>
+            <a:r>
+              <a:rPr lang="en-US" sz="3200" kern="1200">
+                <a:solidFill>
+                  <a:schemeClr val="bg1"/>
+                </a:solidFill>
+                <a:latin typeface="+mj-lt"/>
+                <a:ea typeface="+mj-ea"/>
+                <a:cs typeface="+mj-cs"/>
+              </a:rPr>
+              <a:t>Grid search for hyperparameters</a:t>
+            </a:r>
+          </a:p>
+        </p:txBody>
+      </p:sp>
+      <p:pic>
+        <p:nvPicPr>
+          <p:cNvPr id="6" name="Picture 5">
+            <a:extLst>
+              <a:ext uri="{FF2B5EF4-FFF2-40B4-BE49-F238E27FC236}">
+                <a16:creationId xmlns:a16="http://schemas.microsoft.com/office/drawing/2014/main" id="{1417FB78-C7D2-2BF0-ACF5-C4C413B68DB6}"/>
+              </a:ext>
+            </a:extLst>
+          </p:cNvPr>
+          <p:cNvPicPr>
+            <a:picLocks noChangeAspect="1"/>
+          </p:cNvPicPr>
+          <p:nvPr/>
+        </p:nvPicPr>
+        <p:blipFill>
+          <a:blip r:embed="rId2">
+            <a:extLst>
+              <a:ext uri="{28A0092B-C50C-407E-A947-70E740481C1C}">
+                <a14:useLocalDpi xmlns:a14="http://schemas.microsoft.com/office/drawing/2010/main" val="0"/>
+              </a:ext>
+            </a:extLst>
+          </a:blip>
+          <a:srcRect/>
+          <a:stretch/>
+        </p:blipFill>
+        <p:spPr>
+          <a:xfrm>
+            <a:off x="2431826" y="1453592"/>
+            <a:ext cx="7221817" cy="5210332"/>
+          </a:xfrm>
+          <a:prstGeom prst="rect">
+            <a:avLst/>
+          </a:prstGeom>
+        </p:spPr>
+      </p:pic>
+    </p:spTree>
+    <p:extLst>
+      <p:ext uri="{BB962C8B-B14F-4D97-AF65-F5344CB8AC3E}">
+        <p14:creationId xmlns:p14="http://schemas.microsoft.com/office/powerpoint/2010/main" val="1553930050"/>
+      </p:ext>
+    </p:extLst>
+  </p:cSld>
+  <p:clrMapOvr>
+    <a:masterClrMapping/>
+  </p:clrMapOvr>
+</p:sld>
+</file>
+
+<file path=ppt/slides/slide7.xml><?xml version="1.0" encoding="utf-8"?>
+<p:sld xmlns:a="http://schemas.openxmlformats.org/drawingml/2006/main" xmlns:r="http://schemas.openxmlformats.org/officeDocument/2006/relationships" xmlns:p="http://schemas.openxmlformats.org/presentationml/2006/main">
+  <p:cSld>
+    <p:bg>
+      <p:bgPr>
+        <a:solidFill>
+          <a:schemeClr val="bg1"/>
+        </a:solidFill>
+        <a:effectLst/>
+      </p:bgPr>
+    </p:bg>
+    <p:spTree>
+      <p:nvGrpSpPr>
+        <p:cNvPr id="1" name=""/>
+        <p:cNvGrpSpPr/>
+        <p:nvPr/>
+      </p:nvGrpSpPr>
+      <p:grpSpPr>
+        <a:xfrm>
+          <a:off x="0" y="0"/>
+          <a:ext cx="0" cy="0"/>
+          <a:chOff x="0" y="0"/>
+          <a:chExt cx="0" cy="0"/>
+        </a:xfrm>
+      </p:grpSpPr>
+      <p:sp>
+        <p:nvSpPr>
+          <p:cNvPr id="11" name="Rectangle 10">
+            <a:extLst>
+              <a:ext uri="{FF2B5EF4-FFF2-40B4-BE49-F238E27FC236}">
+                <a16:creationId xmlns:a16="http://schemas.microsoft.com/office/drawing/2014/main" id="{A4AC5506-6312-4701-8D3C-40187889A947}"/>
+              </a:ext>
+              <a:ext uri="{C183D7F6-B498-43B3-948B-1728B52AA6E4}">
+                <adec:decorative xmlns:adec="http://schemas.microsoft.com/office/drawing/2017/decorative" val="1"/>
+              </a:ext>
+            </a:extLst>
+          </p:cNvPr>
+          <p:cNvSpPr>
+            <a:spLocks noGrp="1" noRot="1" noChangeAspect="1" noMove="1" noResize="1" noEditPoints="1" noAdjustHandles="1" noChangeArrowheads="1" noChangeShapeType="1" noTextEdit="1"/>
+          </p:cNvSpPr>
+          <p:nvPr>
+            <p:extLst>
+              <p:ext uri="{386F3935-93C4-4BCD-93E2-E3B085C9AB24}">
+                <p16:designElem xmlns:p16="http://schemas.microsoft.com/office/powerpoint/2015/main" val="1"/>
+              </p:ext>
+            </p:extLst>
+          </p:nvPr>
+        </p:nvSpPr>
+        <p:spPr>
+          <a:xfrm>
+            <a:off x="0" y="651752"/>
+            <a:ext cx="12192000" cy="736551"/>
+          </a:xfrm>
+          <a:prstGeom prst="rect">
+            <a:avLst/>
+          </a:prstGeom>
+          <a:solidFill>
+            <a:schemeClr val="tx1"/>
+          </a:solidFill>
+          <a:ln>
+            <a:noFill/>
+          </a:ln>
+        </p:spPr>
+        <p:style>
+          <a:lnRef idx="2">
+            <a:schemeClr val="accent1">
+              <a:shade val="50000"/>
+            </a:schemeClr>
+          </a:lnRef>
+          <a:fillRef idx="1">
+            <a:schemeClr val="accent1"/>
+          </a:fillRef>
+          <a:effectRef idx="0">
+            <a:schemeClr val="accent1"/>
+          </a:effectRef>
+          <a:fontRef idx="minor">
+            <a:schemeClr val="lt1"/>
+          </a:fontRef>
+        </p:style>
+        <p:txBody>
+          <a:bodyPr rtlCol="0" anchor="ctr"/>
+          <a:lstStyle/>
+          <a:p>
+            <a:pPr algn="ctr"/>
+            <a:endParaRPr lang="en-US"/>
+          </a:p>
+        </p:txBody>
+      </p:sp>
+      <p:sp>
+        <p:nvSpPr>
+          <p:cNvPr id="3" name="Title 2">
+            <a:extLst>
+              <a:ext uri="{FF2B5EF4-FFF2-40B4-BE49-F238E27FC236}">
+                <a16:creationId xmlns:a16="http://schemas.microsoft.com/office/drawing/2014/main" id="{2CA9BFA5-5134-161E-69CA-BF5FFAFCB87B}"/>
+              </a:ext>
+            </a:extLst>
+          </p:cNvPr>
+          <p:cNvSpPr>
+            <a:spLocks noGrp="1"/>
+          </p:cNvSpPr>
+          <p:nvPr>
+            <p:ph type="title"/>
+          </p:nvPr>
+        </p:nvSpPr>
+        <p:spPr>
+          <a:xfrm>
+            <a:off x="556532" y="643467"/>
+            <a:ext cx="11210925" cy="744836"/>
+          </a:xfrm>
+        </p:spPr>
+        <p:txBody>
+          <a:bodyPr vert="horz" lIns="91440" tIns="45720" rIns="91440" bIns="45720" rtlCol="0" anchor="ctr">
+            <a:normAutofit/>
+          </a:bodyPr>
+          <a:lstStyle/>
+          <a:p>
+            <a:pPr algn="ctr"/>
+            <a:r>
+              <a:rPr lang="en-US" sz="3200" kern="1200" dirty="0">
+                <a:solidFill>
+                  <a:schemeClr val="bg1"/>
+                </a:solidFill>
+                <a:latin typeface="+mj-lt"/>
+                <a:ea typeface="+mj-ea"/>
+                <a:cs typeface="+mj-cs"/>
+              </a:rPr>
+              <a:t>Effect of input on MAE, max pred=4</a:t>
+            </a:r>
+          </a:p>
+        </p:txBody>
+      </p:sp>
+      <p:pic>
+        <p:nvPicPr>
+          <p:cNvPr id="6" name="Picture 5">
+            <a:extLst>
+              <a:ext uri="{FF2B5EF4-FFF2-40B4-BE49-F238E27FC236}">
+                <a16:creationId xmlns:a16="http://schemas.microsoft.com/office/drawing/2014/main" id="{62EDAADC-911B-8FDC-5446-C24F114B2E27}"/>
+              </a:ext>
+            </a:extLst>
+          </p:cNvPr>
+          <p:cNvPicPr>
+            <a:picLocks noChangeAspect="1"/>
+          </p:cNvPicPr>
+          <p:nvPr/>
+        </p:nvPicPr>
+        <p:blipFill>
+          <a:blip r:embed="rId2"/>
+          <a:stretch>
+            <a:fillRect/>
+          </a:stretch>
+        </p:blipFill>
+        <p:spPr>
+          <a:xfrm>
+            <a:off x="2888555" y="1675227"/>
+            <a:ext cx="6414890" cy="4394199"/>
+          </a:xfrm>
+          <a:prstGeom prst="rect">
+            <a:avLst/>
+          </a:prstGeom>
+        </p:spPr>
+      </p:pic>
+    </p:spTree>
+    <p:extLst>
+      <p:ext uri="{BB962C8B-B14F-4D97-AF65-F5344CB8AC3E}">
+        <p14:creationId xmlns:p14="http://schemas.microsoft.com/office/powerpoint/2010/main" val="3808400140"/>
+      </p:ext>
+    </p:extLst>
+  </p:cSld>
+  <p:clrMapOvr>
+    <a:masterClrMapping/>
+  </p:clrMapOvr>
+</p:sld>
+</file>
+
+<file path=ppt/slides/slide8.xml><?xml version="1.0" encoding="utf-8"?>
+<p:sld xmlns:a="http://schemas.openxmlformats.org/drawingml/2006/main" xmlns:r="http://schemas.openxmlformats.org/officeDocument/2006/relationships" xmlns:p="http://schemas.openxmlformats.org/presentationml/2006/main">
+  <p:cSld>
+    <p:bg>
+      <p:bgPr>
+        <a:solidFill>
+          <a:schemeClr val="bg1"/>
+        </a:solidFill>
+        <a:effectLst/>
+      </p:bgPr>
+    </p:bg>
+    <p:spTree>
+      <p:nvGrpSpPr>
+        <p:cNvPr id="1" name="">
+          <a:extLst>
+            <a:ext uri="{FF2B5EF4-FFF2-40B4-BE49-F238E27FC236}">
+              <a16:creationId xmlns:a16="http://schemas.microsoft.com/office/drawing/2014/main" id="{DBDAE176-6E84-C8B1-5F3E-59C124B628D8}"/>
+            </a:ext>
+          </a:extLst>
+        </p:cNvPr>
+        <p:cNvGrpSpPr/>
+        <p:nvPr/>
+      </p:nvGrpSpPr>
+      <p:grpSpPr>
+        <a:xfrm>
+          <a:off x="0" y="0"/>
+          <a:ext cx="0" cy="0"/>
+          <a:chOff x="0" y="0"/>
+          <a:chExt cx="0" cy="0"/>
+        </a:xfrm>
+      </p:grpSpPr>
+      <p:sp>
+        <p:nvSpPr>
+          <p:cNvPr id="11" name="Rectangle 10">
+            <a:extLst>
+              <a:ext uri="{FF2B5EF4-FFF2-40B4-BE49-F238E27FC236}">
+                <a16:creationId xmlns:a16="http://schemas.microsoft.com/office/drawing/2014/main" id="{A4AC5506-6312-4701-8D3C-40187889A947}"/>
+              </a:ext>
+              <a:ext uri="{C183D7F6-B498-43B3-948B-1728B52AA6E4}">
+                <adec:decorative xmlns:adec="http://schemas.microsoft.com/office/drawing/2017/decorative" val="1"/>
+              </a:ext>
+            </a:extLst>
+          </p:cNvPr>
+          <p:cNvSpPr>
+            <a:spLocks noGrp="1" noRot="1" noChangeAspect="1" noMove="1" noResize="1" noEditPoints="1" noAdjustHandles="1" noChangeArrowheads="1" noChangeShapeType="1" noTextEdit="1"/>
+          </p:cNvSpPr>
+          <p:nvPr>
+            <p:extLst>
+              <p:ext uri="{386F3935-93C4-4BCD-93E2-E3B085C9AB24}">
+                <p16:designElem xmlns:p16="http://schemas.microsoft.com/office/powerpoint/2015/main" val="1"/>
+              </p:ext>
+            </p:extLst>
+          </p:nvPr>
+        </p:nvSpPr>
+        <p:spPr>
+          <a:xfrm>
+            <a:off x="0" y="651752"/>
+            <a:ext cx="12192000" cy="736551"/>
+          </a:xfrm>
+          <a:prstGeom prst="rect">
+            <a:avLst/>
+          </a:prstGeom>
+          <a:solidFill>
+            <a:schemeClr val="tx1"/>
+          </a:solidFill>
+          <a:ln>
+            <a:noFill/>
+          </a:ln>
+        </p:spPr>
+        <p:style>
+          <a:lnRef idx="2">
+            <a:schemeClr val="accent1">
+              <a:shade val="50000"/>
+            </a:schemeClr>
+          </a:lnRef>
+          <a:fillRef idx="1">
+            <a:schemeClr val="accent1"/>
+          </a:fillRef>
+          <a:effectRef idx="0">
+            <a:schemeClr val="accent1"/>
+          </a:effectRef>
+          <a:fontRef idx="minor">
+            <a:schemeClr val="lt1"/>
+          </a:fontRef>
+        </p:style>
+        <p:txBody>
+          <a:bodyPr rtlCol="0" anchor="ctr"/>
+          <a:lstStyle/>
+          <a:p>
+            <a:pPr algn="ctr"/>
+            <a:endParaRPr lang="en-US"/>
+          </a:p>
+        </p:txBody>
+      </p:sp>
+      <p:sp>
+        <p:nvSpPr>
+          <p:cNvPr id="3" name="Title 2">
+            <a:extLst>
+              <a:ext uri="{FF2B5EF4-FFF2-40B4-BE49-F238E27FC236}">
+                <a16:creationId xmlns:a16="http://schemas.microsoft.com/office/drawing/2014/main" id="{E62EA66A-38DC-99E6-A7C1-14DDAE86E8B1}"/>
+              </a:ext>
+            </a:extLst>
+          </p:cNvPr>
+          <p:cNvSpPr>
+            <a:spLocks noGrp="1"/>
+          </p:cNvSpPr>
+          <p:nvPr>
+            <p:ph type="title"/>
+          </p:nvPr>
+        </p:nvSpPr>
+        <p:spPr>
+          <a:xfrm>
+            <a:off x="556532" y="643467"/>
+            <a:ext cx="11210925" cy="744836"/>
+          </a:xfrm>
+        </p:spPr>
+        <p:txBody>
+          <a:bodyPr vert="horz" lIns="91440" tIns="45720" rIns="91440" bIns="45720" rtlCol="0" anchor="ctr">
+            <a:normAutofit/>
+          </a:bodyPr>
+          <a:lstStyle/>
+          <a:p>
+            <a:pPr algn="ctr"/>
+            <a:r>
+              <a:rPr lang="en-US" sz="3200" kern="1200">
+                <a:solidFill>
+                  <a:schemeClr val="bg1"/>
+                </a:solidFill>
+                <a:latin typeface="+mj-lt"/>
+                <a:ea typeface="+mj-ea"/>
+                <a:cs typeface="+mj-cs"/>
+              </a:rPr>
+              <a:t>Effect of input on MAE</a:t>
+            </a:r>
+          </a:p>
+        </p:txBody>
+      </p:sp>
+      <p:pic>
+        <p:nvPicPr>
+          <p:cNvPr id="6" name="Picture 5">
+            <a:extLst>
+              <a:ext uri="{FF2B5EF4-FFF2-40B4-BE49-F238E27FC236}">
+                <a16:creationId xmlns:a16="http://schemas.microsoft.com/office/drawing/2014/main" id="{D2C5412C-2155-901B-E7C1-C951AECD6743}"/>
+              </a:ext>
+            </a:extLst>
+          </p:cNvPr>
+          <p:cNvPicPr>
+            <a:picLocks noChangeAspect="1"/>
+          </p:cNvPicPr>
+          <p:nvPr/>
+        </p:nvPicPr>
+        <p:blipFill>
+          <a:blip r:embed="rId2">
+            <a:extLst>
+              <a:ext uri="{28A0092B-C50C-407E-A947-70E740481C1C}">
+                <a14:useLocalDpi xmlns:a14="http://schemas.microsoft.com/office/drawing/2010/main" val="0"/>
+              </a:ext>
+            </a:extLst>
+          </a:blip>
+          <a:stretch/>
+        </p:blipFill>
+        <p:spPr>
+          <a:xfrm>
+            <a:off x="3065518" y="1675227"/>
+            <a:ext cx="6060963" cy="4394199"/>
+          </a:xfrm>
+          <a:prstGeom prst="rect">
+            <a:avLst/>
+          </a:prstGeom>
+        </p:spPr>
+      </p:pic>
+    </p:spTree>
+    <p:extLst>
+      <p:ext uri="{BB962C8B-B14F-4D97-AF65-F5344CB8AC3E}">
+        <p14:creationId xmlns:p14="http://schemas.microsoft.com/office/powerpoint/2010/main" val="3108219209"/>
+      </p:ext>
+    </p:extLst>
+  </p:cSld>
+  <p:clrMapOvr>
+    <a:masterClrMapping/>
+  </p:clrMapOvr>
+</p:sld>
+</file>
+
+<file path=ppt/slides/slide9.xml><?xml version="1.0" encoding="utf-8"?>
+<p:sld xmlns:a="http://schemas.openxmlformats.org/drawingml/2006/main" xmlns:r="http://schemas.openxmlformats.org/officeDocument/2006/relationships" xmlns:p="http://schemas.openxmlformats.org/presentationml/2006/main">
+  <p:cSld>
+    <p:bg>
+      <p:bgPr>
+        <a:solidFill>
+          <a:schemeClr val="bg1"/>
+        </a:solidFill>
+        <a:effectLst/>
+      </p:bgPr>
+    </p:bg>
+    <p:spTree>
+      <p:nvGrpSpPr>
+        <p:cNvPr id="1" name="">
+          <a:extLst>
+            <a:ext uri="{FF2B5EF4-FFF2-40B4-BE49-F238E27FC236}">
+              <a16:creationId xmlns:a16="http://schemas.microsoft.com/office/drawing/2014/main" id="{447A8F32-7CF4-70B8-4AF6-D39CF72F766C}"/>
+            </a:ext>
+          </a:extLst>
+        </p:cNvPr>
+        <p:cNvGrpSpPr/>
+        <p:nvPr/>
+      </p:nvGrpSpPr>
+      <p:grpSpPr>
+        <a:xfrm>
+          <a:off x="0" y="0"/>
+          <a:ext cx="0" cy="0"/>
+          <a:chOff x="0" y="0"/>
+          <a:chExt cx="0" cy="0"/>
+        </a:xfrm>
+      </p:grpSpPr>
+      <p:sp>
+        <p:nvSpPr>
+          <p:cNvPr id="11" name="Rectangle 10">
+            <a:extLst>
+              <a:ext uri="{FF2B5EF4-FFF2-40B4-BE49-F238E27FC236}">
+                <a16:creationId xmlns:a16="http://schemas.microsoft.com/office/drawing/2014/main" id="{A4AC5506-6312-4701-8D3C-40187889A947}"/>
+              </a:ext>
+              <a:ext uri="{C183D7F6-B498-43B3-948B-1728B52AA6E4}">
+                <adec:decorative xmlns:adec="http://schemas.microsoft.com/office/drawing/2017/decorative" val="1"/>
+              </a:ext>
+            </a:extLst>
+          </p:cNvPr>
+          <p:cNvSpPr>
+            <a:spLocks noGrp="1" noRot="1" noChangeAspect="1" noMove="1" noResize="1" noEditPoints="1" noAdjustHandles="1" noChangeArrowheads="1" noChangeShapeType="1" noTextEdit="1"/>
+          </p:cNvSpPr>
+          <p:nvPr>
+            <p:extLst>
+              <p:ext uri="{386F3935-93C4-4BCD-93E2-E3B085C9AB24}">
+                <p16:designElem xmlns:p16="http://schemas.microsoft.com/office/powerpoint/2015/main" val="1"/>
+              </p:ext>
+            </p:extLst>
+          </p:nvPr>
+        </p:nvSpPr>
+        <p:spPr>
+          <a:xfrm>
+            <a:off x="0" y="651752"/>
+            <a:ext cx="12192000" cy="736551"/>
+          </a:xfrm>
+          <a:prstGeom prst="rect">
+            <a:avLst/>
+          </a:prstGeom>
+          <a:solidFill>
+            <a:schemeClr val="tx1"/>
+          </a:solidFill>
+          <a:ln>
+            <a:noFill/>
+          </a:ln>
+        </p:spPr>
+        <p:style>
+          <a:lnRef idx="2">
+            <a:schemeClr val="accent1">
+              <a:shade val="50000"/>
+            </a:schemeClr>
+          </a:lnRef>
+          <a:fillRef idx="1">
+            <a:schemeClr val="accent1"/>
+          </a:fillRef>
+          <a:effectRef idx="0">
+            <a:schemeClr val="accent1"/>
+          </a:effectRef>
+          <a:fontRef idx="minor">
+            <a:schemeClr val="lt1"/>
+          </a:fontRef>
+        </p:style>
+        <p:txBody>
+          <a:bodyPr rtlCol="0" anchor="ctr"/>
+          <a:lstStyle/>
+          <a:p>
+            <a:pPr algn="ctr"/>
+            <a:endParaRPr lang="en-US"/>
+          </a:p>
+        </p:txBody>
+      </p:sp>
+      <p:sp>
+        <p:nvSpPr>
+          <p:cNvPr id="3" name="Title 2">
+            <a:extLst>
+              <a:ext uri="{FF2B5EF4-FFF2-40B4-BE49-F238E27FC236}">
+                <a16:creationId xmlns:a16="http://schemas.microsoft.com/office/drawing/2014/main" id="{B8F12D1F-028B-943B-63F6-3A8344A9F170}"/>
+              </a:ext>
+            </a:extLst>
+          </p:cNvPr>
+          <p:cNvSpPr>
+            <a:spLocks noGrp="1"/>
+          </p:cNvSpPr>
+          <p:nvPr>
+            <p:ph type="title"/>
+          </p:nvPr>
+        </p:nvSpPr>
+        <p:spPr>
+          <a:xfrm>
+            <a:off x="556532" y="643467"/>
+            <a:ext cx="11210925" cy="744836"/>
+          </a:xfrm>
+        </p:spPr>
+        <p:txBody>
+          <a:bodyPr vert="horz" lIns="91440" tIns="45720" rIns="91440" bIns="45720" rtlCol="0" anchor="ctr">
+            <a:normAutofit/>
+          </a:bodyPr>
+          <a:lstStyle/>
+          <a:p>
+            <a:pPr algn="ctr"/>
+            <a:r>
+              <a:rPr lang="en-US" sz="3200" kern="1200" dirty="0">
+                <a:solidFill>
+                  <a:schemeClr val="bg1"/>
+                </a:solidFill>
+                <a:latin typeface="+mj-lt"/>
+                <a:ea typeface="+mj-ea"/>
+                <a:cs typeface="+mj-cs"/>
+              </a:rPr>
+              <a:t>Effect of input on MAE, max pred=8</a:t>
+            </a:r>
+          </a:p>
+        </p:txBody>
+      </p:sp>
+      <p:pic>
+        <p:nvPicPr>
+          <p:cNvPr id="6" name="Picture 5">
+            <a:extLst>
+              <a:ext uri="{FF2B5EF4-FFF2-40B4-BE49-F238E27FC236}">
+                <a16:creationId xmlns:a16="http://schemas.microsoft.com/office/drawing/2014/main" id="{ABBF35B2-D3F8-4453-5D8E-9D45A9BD81A1}"/>
+              </a:ext>
+            </a:extLst>
+          </p:cNvPr>
+          <p:cNvPicPr>
+            <a:picLocks noChangeAspect="1"/>
+          </p:cNvPicPr>
+          <p:nvPr/>
+        </p:nvPicPr>
+        <p:blipFill>
+          <a:blip r:embed="rId2">
+            <a:extLst>
+              <a:ext uri="{28A0092B-C50C-407E-A947-70E740481C1C}">
+                <a14:useLocalDpi xmlns:a14="http://schemas.microsoft.com/office/drawing/2010/main" val="0"/>
+              </a:ext>
+            </a:extLst>
+          </a:blip>
+          <a:srcRect/>
+          <a:stretch/>
+        </p:blipFill>
+        <p:spPr>
+          <a:xfrm>
+            <a:off x="2945097" y="1675227"/>
+            <a:ext cx="6301805" cy="4394199"/>
+          </a:xfrm>
+          <a:prstGeom prst="rect">
+            <a:avLst/>
+          </a:prstGeom>
+        </p:spPr>
+      </p:pic>
+    </p:spTree>
+    <p:extLst>
+      <p:ext uri="{BB962C8B-B14F-4D97-AF65-F5344CB8AC3E}">
+        <p14:creationId xmlns:p14="http://schemas.microsoft.com/office/powerpoint/2010/main" val="3480715306"/>
       </p:ext>
     </p:extLst>
   </p:cSld>

</xml_diff>